<commit_message>
update student flow - first experience and classes
</commit_message>
<xml_diff>
--- a/Students flow.pptx
+++ b/Students flow.pptx
@@ -249,7 +249,7 @@
           <a:p>
             <a:fld id="{244407FF-88D8-4799-B8FC-E0203F3B8DD7}" type="datetimeFigureOut">
               <a:rPr lang="fr-FR" smtClean="0"/>
-              <a:t>24/09/2014</a:t>
+              <a:t>03/10/2014</a:t>
             </a:fld>
             <a:endParaRPr lang="fr-FR"/>
           </a:p>
@@ -419,7 +419,7 @@
           <a:p>
             <a:fld id="{244407FF-88D8-4799-B8FC-E0203F3B8DD7}" type="datetimeFigureOut">
               <a:rPr lang="fr-FR" smtClean="0"/>
-              <a:t>24/09/2014</a:t>
+              <a:t>03/10/2014</a:t>
             </a:fld>
             <a:endParaRPr lang="fr-FR"/>
           </a:p>
@@ -599,7 +599,7 @@
           <a:p>
             <a:fld id="{244407FF-88D8-4799-B8FC-E0203F3B8DD7}" type="datetimeFigureOut">
               <a:rPr lang="fr-FR" smtClean="0"/>
-              <a:t>24/09/2014</a:t>
+              <a:t>03/10/2014</a:t>
             </a:fld>
             <a:endParaRPr lang="fr-FR"/>
           </a:p>
@@ -769,7 +769,7 @@
           <a:p>
             <a:fld id="{244407FF-88D8-4799-B8FC-E0203F3B8DD7}" type="datetimeFigureOut">
               <a:rPr lang="fr-FR" smtClean="0"/>
-              <a:t>24/09/2014</a:t>
+              <a:t>03/10/2014</a:t>
             </a:fld>
             <a:endParaRPr lang="fr-FR"/>
           </a:p>
@@ -1015,7 +1015,7 @@
           <a:p>
             <a:fld id="{244407FF-88D8-4799-B8FC-E0203F3B8DD7}" type="datetimeFigureOut">
               <a:rPr lang="fr-FR" smtClean="0"/>
-              <a:t>24/09/2014</a:t>
+              <a:t>03/10/2014</a:t>
             </a:fld>
             <a:endParaRPr lang="fr-FR"/>
           </a:p>
@@ -1247,7 +1247,7 @@
           <a:p>
             <a:fld id="{244407FF-88D8-4799-B8FC-E0203F3B8DD7}" type="datetimeFigureOut">
               <a:rPr lang="fr-FR" smtClean="0"/>
-              <a:t>24/09/2014</a:t>
+              <a:t>03/10/2014</a:t>
             </a:fld>
             <a:endParaRPr lang="fr-FR"/>
           </a:p>
@@ -1614,7 +1614,7 @@
           <a:p>
             <a:fld id="{244407FF-88D8-4799-B8FC-E0203F3B8DD7}" type="datetimeFigureOut">
               <a:rPr lang="fr-FR" smtClean="0"/>
-              <a:t>24/09/2014</a:t>
+              <a:t>03/10/2014</a:t>
             </a:fld>
             <a:endParaRPr lang="fr-FR"/>
           </a:p>
@@ -1732,7 +1732,7 @@
           <a:p>
             <a:fld id="{244407FF-88D8-4799-B8FC-E0203F3B8DD7}" type="datetimeFigureOut">
               <a:rPr lang="fr-FR" smtClean="0"/>
-              <a:t>24/09/2014</a:t>
+              <a:t>03/10/2014</a:t>
             </a:fld>
             <a:endParaRPr lang="fr-FR"/>
           </a:p>
@@ -1827,7 +1827,7 @@
           <a:p>
             <a:fld id="{244407FF-88D8-4799-B8FC-E0203F3B8DD7}" type="datetimeFigureOut">
               <a:rPr lang="fr-FR" smtClean="0"/>
-              <a:t>24/09/2014</a:t>
+              <a:t>03/10/2014</a:t>
             </a:fld>
             <a:endParaRPr lang="fr-FR"/>
           </a:p>
@@ -2104,7 +2104,7 @@
           <a:p>
             <a:fld id="{244407FF-88D8-4799-B8FC-E0203F3B8DD7}" type="datetimeFigureOut">
               <a:rPr lang="fr-FR" smtClean="0"/>
-              <a:t>24/09/2014</a:t>
+              <a:t>03/10/2014</a:t>
             </a:fld>
             <a:endParaRPr lang="fr-FR"/>
           </a:p>
@@ -2357,7 +2357,7 @@
           <a:p>
             <a:fld id="{244407FF-88D8-4799-B8FC-E0203F3B8DD7}" type="datetimeFigureOut">
               <a:rPr lang="fr-FR" smtClean="0"/>
-              <a:t>24/09/2014</a:t>
+              <a:t>03/10/2014</a:t>
             </a:fld>
             <a:endParaRPr lang="fr-FR"/>
           </a:p>
@@ -2570,7 +2570,7 @@
           <a:p>
             <a:fld id="{244407FF-88D8-4799-B8FC-E0203F3B8DD7}" type="datetimeFigureOut">
               <a:rPr lang="fr-FR" smtClean="0"/>
-              <a:t>24/09/2014</a:t>
+              <a:t>03/10/2014</a:t>
             </a:fld>
             <a:endParaRPr lang="fr-FR"/>
           </a:p>
@@ -3074,7 +3074,7 @@
         </p:nvSpPr>
         <p:spPr>
           <a:xfrm>
-            <a:off x="3178319" y="3962245"/>
+            <a:off x="7446892" y="1351633"/>
             <a:ext cx="1597152" cy="755904"/>
           </a:xfrm>
           <a:prstGeom prst="rect">
@@ -3130,8 +3130,8 @@
         </p:nvSpPr>
         <p:spPr>
           <a:xfrm>
-            <a:off x="7498081" y="3882997"/>
-            <a:ext cx="2036064" cy="914400"/>
+            <a:off x="9678444" y="2801700"/>
+            <a:ext cx="2175576" cy="1063752"/>
           </a:xfrm>
           <a:prstGeom prst="rect">
             <a:avLst/>
@@ -3160,79 +3160,27 @@
             <a:pPr algn="ctr"/>
             <a:r>
               <a:rPr lang="fr-FR" dirty="0" smtClean="0"/>
-              <a:t>Input email/</a:t>
-            </a:r>
-            <a:r>
-              <a:rPr lang="fr-FR" dirty="0" err="1" smtClean="0"/>
-              <a:t>access</a:t>
-            </a:r>
-            <a:r>
-              <a:rPr lang="fr-FR" dirty="0" smtClean="0"/>
-              <a:t> code</a:t>
-            </a:r>
-            <a:endParaRPr lang="fr-FR" dirty="0"/>
-          </a:p>
-        </p:txBody>
-      </p:sp>
-      <p:sp>
-        <p:nvSpPr>
-          <p:cNvPr id="8" name="Rectangle 7"/>
-          <p:cNvSpPr/>
-          <p:nvPr/>
-        </p:nvSpPr>
-        <p:spPr>
-          <a:xfrm>
-            <a:off x="10135754" y="3882997"/>
-            <a:ext cx="1560576" cy="914400"/>
-          </a:xfrm>
-          <a:prstGeom prst="rect">
-            <a:avLst/>
-          </a:prstGeom>
-        </p:spPr>
-        <p:style>
-          <a:lnRef idx="2">
-            <a:schemeClr val="accent1">
-              <a:shade val="50000"/>
-            </a:schemeClr>
-          </a:lnRef>
-          <a:fillRef idx="1">
-            <a:schemeClr val="accent1"/>
-          </a:fillRef>
-          <a:effectRef idx="0">
-            <a:schemeClr val="accent1"/>
-          </a:effectRef>
-          <a:fontRef idx="minor">
-            <a:schemeClr val="lt1"/>
-          </a:fontRef>
-        </p:style>
-        <p:txBody>
-          <a:bodyPr rtlCol="0" anchor="ctr"/>
-          <a:lstStyle/>
-          <a:p>
-            <a:pPr algn="ctr"/>
-            <a:r>
-              <a:rPr lang="fr-FR" dirty="0" smtClean="0"/>
               <a:t>Input </a:t>
             </a:r>
             <a:r>
-              <a:rPr lang="fr-FR" dirty="0" err="1" smtClean="0"/>
-              <a:t>chinese</a:t>
-            </a:r>
-            <a:r>
-              <a:rPr lang="fr-FR" dirty="0" smtClean="0"/>
-              <a:t> </a:t>
+              <a:rPr lang="fr-FR" altLang="zh-CN" dirty="0" err="1" smtClean="0"/>
+              <a:t>username</a:t>
+            </a:r>
+            <a:r>
+              <a:rPr lang="fr-FR" dirty="0" smtClean="0"/>
+              <a:t>/</a:t>
+            </a:r>
+            <a:r>
+              <a:rPr lang="fr-FR" dirty="0" err="1" smtClean="0"/>
+              <a:t>pwd</a:t>
+            </a:r>
+            <a:r>
+              <a:rPr lang="fr-FR" dirty="0" smtClean="0"/>
+              <a:t>/first and last </a:t>
             </a:r>
             <a:r>
               <a:rPr lang="fr-FR" dirty="0" err="1" smtClean="0"/>
               <a:t>name</a:t>
-            </a:r>
-            <a:r>
-              <a:rPr lang="fr-FR" dirty="0" smtClean="0"/>
-              <a:t> and set </a:t>
-            </a:r>
-            <a:r>
-              <a:rPr lang="fr-FR" dirty="0" err="1" smtClean="0"/>
-              <a:t>password</a:t>
             </a:r>
             <a:endParaRPr lang="fr-FR" dirty="0"/>
           </a:p>
@@ -3246,7 +3194,7 @@
         </p:nvSpPr>
         <p:spPr>
           <a:xfrm>
-            <a:off x="262601" y="3733645"/>
+            <a:off x="4242514" y="1135148"/>
             <a:ext cx="2520764" cy="1213104"/>
           </a:xfrm>
           <a:prstGeom prst="rect">
@@ -3331,8 +3279,8 @@
         </p:nvSpPr>
         <p:spPr>
           <a:xfrm>
-            <a:off x="307001" y="5989010"/>
-            <a:ext cx="5370124" cy="646331"/>
+            <a:off x="350959" y="5784794"/>
+            <a:ext cx="6220998" cy="923330"/>
           </a:xfrm>
           <a:prstGeom prst="rect">
             <a:avLst/>
@@ -3371,11 +3319,7 @@
             </a:r>
             <a:r>
               <a:rPr lang="fr-FR" dirty="0" smtClean="0"/>
-              <a:t> code </a:t>
-            </a:r>
-            <a:r>
-              <a:rPr lang="fr-FR" dirty="0" smtClean="0"/>
-              <a:t>or QBR </a:t>
+              <a:t> code or QBR </a:t>
             </a:r>
             <a:r>
               <a:rPr lang="fr-FR" dirty="0" err="1" smtClean="0"/>
@@ -3383,53 +3327,104 @@
             </a:r>
             <a:r>
               <a:rPr lang="fr-FR" dirty="0" smtClean="0"/>
+              <a:t> email or at class</a:t>
+            </a:r>
+          </a:p>
+          <a:p>
+            <a:r>
+              <a:rPr lang="fr-FR" dirty="0" smtClean="0"/>
+              <a:t>*</a:t>
+            </a:r>
+            <a:r>
+              <a:rPr lang="fr-FR" dirty="0" err="1" smtClean="0"/>
+              <a:t>we</a:t>
+            </a:r>
+            <a:r>
+              <a:rPr lang="fr-FR" dirty="0" smtClean="0"/>
               <a:t> </a:t>
             </a:r>
             <a:r>
-              <a:rPr lang="fr-FR" dirty="0" smtClean="0"/>
-              <a:t>email or at class</a:t>
-            </a:r>
-          </a:p>
-          <a:p>
-            <a:r>
-              <a:rPr lang="fr-FR" dirty="0" smtClean="0"/>
+              <a:rPr lang="fr-FR" dirty="0" err="1" smtClean="0"/>
+              <a:t>will</a:t>
+            </a:r>
+            <a:r>
+              <a:rPr lang="fr-FR" dirty="0" smtClean="0"/>
+              <a:t> display </a:t>
+            </a:r>
+            <a:r>
+              <a:rPr lang="fr-FR" dirty="0" err="1" smtClean="0"/>
+              <a:t>student</a:t>
+            </a:r>
+            <a:r>
+              <a:rPr lang="fr-FR" dirty="0" smtClean="0"/>
+              <a:t> </a:t>
+            </a:r>
+            <a:r>
+              <a:rPr lang="fr-FR" dirty="0" err="1" smtClean="0"/>
+              <a:t>name</a:t>
+            </a:r>
+            <a:r>
+              <a:rPr lang="fr-FR" dirty="0" smtClean="0"/>
+              <a:t> at the </a:t>
+            </a:r>
+            <a:r>
+              <a:rPr lang="fr-FR" dirty="0" err="1" smtClean="0"/>
+              <a:t>app</a:t>
+            </a:r>
+            <a:endParaRPr lang="fr-FR" dirty="0" smtClean="0"/>
+          </a:p>
+          <a:p>
+            <a:r>
+              <a:rPr lang="zh-CN" altLang="fr-FR" dirty="0" smtClean="0"/>
               <a:t>*</a:t>
             </a:r>
             <a:r>
-              <a:rPr lang="fr-FR" dirty="0" err="1" smtClean="0"/>
-              <a:t>we</a:t>
-            </a:r>
-            <a:r>
-              <a:rPr lang="fr-FR" dirty="0" smtClean="0"/>
+              <a:rPr lang="fr-FR" altLang="zh-CN" dirty="0" err="1" smtClean="0"/>
+              <a:t>username</a:t>
+            </a:r>
+            <a:r>
+              <a:rPr lang="fr-FR" altLang="zh-CN" dirty="0" smtClean="0"/>
               <a:t> </a:t>
             </a:r>
             <a:r>
-              <a:rPr lang="fr-FR" dirty="0" err="1" smtClean="0"/>
-              <a:t>will</a:t>
-            </a:r>
-            <a:r>
-              <a:rPr lang="fr-FR" dirty="0" smtClean="0"/>
-              <a:t> display </a:t>
-            </a:r>
-            <a:r>
-              <a:rPr lang="fr-FR" dirty="0" err="1" smtClean="0"/>
-              <a:t>student</a:t>
-            </a:r>
-            <a:r>
-              <a:rPr lang="fr-FR" dirty="0" smtClean="0"/>
+              <a:rPr lang="fr-FR" altLang="zh-CN" dirty="0" err="1" smtClean="0"/>
+              <a:t>can</a:t>
+            </a:r>
+            <a:r>
+              <a:rPr lang="fr-FR" altLang="zh-CN" dirty="0" smtClean="0"/>
               <a:t> </a:t>
             </a:r>
             <a:r>
-              <a:rPr lang="fr-FR" dirty="0" err="1" smtClean="0"/>
-              <a:t>name</a:t>
-            </a:r>
-            <a:r>
-              <a:rPr lang="fr-FR" dirty="0" smtClean="0"/>
-              <a:t> at the </a:t>
-            </a:r>
-            <a:r>
-              <a:rPr lang="fr-FR" dirty="0" err="1" smtClean="0"/>
-              <a:t>app</a:t>
+              <a:rPr lang="fr-FR" altLang="zh-CN" dirty="0" err="1" smtClean="0"/>
+              <a:t>be</a:t>
+            </a:r>
+            <a:r>
+              <a:rPr lang="fr-FR" altLang="zh-CN" dirty="0" smtClean="0"/>
+              <a:t> </a:t>
+            </a:r>
+            <a:r>
+              <a:rPr lang="fr-FR" altLang="zh-CN" dirty="0" err="1" smtClean="0"/>
+              <a:t>either</a:t>
+            </a:r>
+            <a:r>
+              <a:rPr lang="fr-FR" altLang="zh-CN" dirty="0" smtClean="0"/>
+              <a:t> mobile # or email </a:t>
+            </a:r>
+            <a:r>
+              <a:rPr lang="fr-FR" altLang="zh-CN" dirty="0" err="1" smtClean="0"/>
+              <a:t>address</a:t>
+            </a:r>
+            <a:r>
+              <a:rPr lang="fr-FR" altLang="zh-CN" dirty="0" smtClean="0"/>
+              <a:t> or </a:t>
+            </a:r>
+            <a:r>
+              <a:rPr lang="fr-FR" altLang="zh-CN" dirty="0" err="1" smtClean="0"/>
+              <a:t>any</a:t>
+            </a:r>
+            <a:r>
+              <a:rPr lang="fr-FR" altLang="zh-CN" dirty="0" smtClean="0"/>
+              <a:t> string</a:t>
             </a:r>
             <a:endParaRPr lang="fr-FR" dirty="0"/>
           </a:p>
@@ -3443,7 +3438,7 @@
         </p:nvSpPr>
         <p:spPr>
           <a:xfrm>
-            <a:off x="218643" y="2060448"/>
+            <a:off x="307001" y="1182624"/>
             <a:ext cx="2609088" cy="1093922"/>
           </a:xfrm>
           <a:prstGeom prst="rect">
@@ -3522,15 +3517,15 @@
         <p:nvCxnSpPr>
           <p:cNvPr id="14" name="Straight Arrow Connector 13"/>
           <p:cNvCxnSpPr>
-            <a:stCxn id="12" idx="2"/>
-            <a:endCxn id="9" idx="0"/>
+            <a:stCxn id="12" idx="3"/>
+            <a:endCxn id="9" idx="1"/>
           </p:cNvCxnSpPr>
           <p:nvPr/>
         </p:nvCxnSpPr>
         <p:spPr>
-          <a:xfrm flipH="1">
-            <a:off x="1522983" y="3154370"/>
-            <a:ext cx="204" cy="579275"/>
+          <a:xfrm>
+            <a:off x="2916089" y="1729585"/>
+            <a:ext cx="1326425" cy="12115"/>
           </a:xfrm>
           <a:prstGeom prst="straightConnector1">
             <a:avLst/>
@@ -3564,9 +3559,9 @@
           <p:nvPr/>
         </p:nvCxnSpPr>
         <p:spPr>
-          <a:xfrm>
-            <a:off x="2783365" y="4340197"/>
-            <a:ext cx="394954" cy="0"/>
+          <a:xfrm flipV="1">
+            <a:off x="6763278" y="1729585"/>
+            <a:ext cx="683614" cy="12115"/>
           </a:xfrm>
           <a:prstGeom prst="straightConnector1">
             <a:avLst/>
@@ -3600,45 +3595,9 @@
           <p:nvPr/>
         </p:nvCxnSpPr>
         <p:spPr>
-          <a:xfrm>
-            <a:off x="4775471" y="4340197"/>
-            <a:ext cx="523849" cy="0"/>
-          </a:xfrm>
-          <a:prstGeom prst="straightConnector1">
-            <a:avLst/>
-          </a:prstGeom>
-          <a:ln>
-            <a:tailEnd type="triangle"/>
-          </a:ln>
-        </p:spPr>
-        <p:style>
-          <a:lnRef idx="1">
-            <a:schemeClr val="accent1"/>
-          </a:lnRef>
-          <a:fillRef idx="0">
-            <a:schemeClr val="accent1"/>
-          </a:fillRef>
-          <a:effectRef idx="0">
-            <a:schemeClr val="accent1"/>
-          </a:effectRef>
-          <a:fontRef idx="minor">
-            <a:schemeClr val="tx1"/>
-          </a:fontRef>
-        </p:style>
-      </p:cxnSp>
-      <p:cxnSp>
-        <p:nvCxnSpPr>
-          <p:cNvPr id="20" name="Straight Arrow Connector 19"/>
-          <p:cNvCxnSpPr>
-            <a:stCxn id="6" idx="3"/>
-            <a:endCxn id="8" idx="1"/>
-          </p:cNvCxnSpPr>
-          <p:nvPr/>
-        </p:nvCxnSpPr>
-        <p:spPr>
-          <a:xfrm>
-            <a:off x="9534145" y="4340197"/>
-            <a:ext cx="601609" cy="0"/>
+          <a:xfrm flipV="1">
+            <a:off x="9044044" y="1723257"/>
+            <a:ext cx="923612" cy="6328"/>
           </a:xfrm>
           <a:prstGeom prst="straightConnector1">
             <a:avLst/>
@@ -3700,14 +3659,14 @@
       </p:sp>
       <p:sp>
         <p:nvSpPr>
-          <p:cNvPr id="29" name="Rectangle 28"/>
+          <p:cNvPr id="40" name="Rectangle 39"/>
           <p:cNvSpPr/>
           <p:nvPr/>
         </p:nvSpPr>
         <p:spPr>
           <a:xfrm>
-            <a:off x="10182964" y="5315634"/>
-            <a:ext cx="1473338" cy="902286"/>
+            <a:off x="9967656" y="1345305"/>
+            <a:ext cx="1597152" cy="755904"/>
           </a:xfrm>
           <a:prstGeom prst="rect">
             <a:avLst/>
@@ -3735,20 +3694,16 @@
           <a:p>
             <a:pPr algn="ctr"/>
             <a:r>
-              <a:rPr lang="fr-FR" dirty="0" err="1" smtClean="0"/>
-              <a:t>Get</a:t>
-            </a:r>
-            <a:r>
-              <a:rPr lang="fr-FR" dirty="0" smtClean="0"/>
-              <a:t> </a:t>
-            </a:r>
-            <a:r>
-              <a:rPr lang="fr-FR" dirty="0" err="1" smtClean="0"/>
-              <a:t>into</a:t>
-            </a:r>
-            <a:r>
-              <a:rPr lang="fr-FR" dirty="0" smtClean="0"/>
-              <a:t> main UI</a:t>
+              <a:rPr lang="fr-FR" dirty="0" smtClean="0"/>
+              <a:t>Select </a:t>
+            </a:r>
+            <a:r>
+              <a:rPr lang="fr-FR" dirty="0" err="1" smtClean="0"/>
+              <a:t>Sign</a:t>
+            </a:r>
+            <a:r>
+              <a:rPr lang="fr-FR" dirty="0" smtClean="0"/>
+              <a:t>-up</a:t>
             </a:r>
             <a:endParaRPr lang="fr-FR" dirty="0"/>
           </a:p>
@@ -3756,17 +3711,17 @@
       </p:sp>
       <p:cxnSp>
         <p:nvCxnSpPr>
-          <p:cNvPr id="31" name="Straight Arrow Connector 30"/>
+          <p:cNvPr id="50" name="Straight Arrow Connector 49"/>
           <p:cNvCxnSpPr>
-            <a:stCxn id="8" idx="2"/>
-            <a:endCxn id="29" idx="0"/>
+            <a:stCxn id="40" idx="2"/>
+            <a:endCxn id="6" idx="0"/>
           </p:cNvCxnSpPr>
           <p:nvPr/>
         </p:nvCxnSpPr>
         <p:spPr>
           <a:xfrm>
-            <a:off x="10916042" y="4797397"/>
-            <a:ext cx="3591" cy="518237"/>
+            <a:off x="10766232" y="2101209"/>
+            <a:ext cx="0" cy="700491"/>
           </a:xfrm>
           <a:prstGeom prst="straightConnector1">
             <a:avLst/>
@@ -3792,16 +3747,16 @@
       </p:cxnSp>
       <p:sp>
         <p:nvSpPr>
-          <p:cNvPr id="40" name="Rectangle 39"/>
+          <p:cNvPr id="2" name="Diamond 1"/>
           <p:cNvSpPr/>
           <p:nvPr/>
         </p:nvSpPr>
         <p:spPr>
           <a:xfrm>
-            <a:off x="5299320" y="3962245"/>
-            <a:ext cx="1597152" cy="755904"/>
-          </a:xfrm>
-          <a:prstGeom prst="rect">
+            <a:off x="6326044" y="2587126"/>
+            <a:ext cx="2241696" cy="1566671"/>
+          </a:xfrm>
+          <a:prstGeom prst="diamond">
             <a:avLst/>
           </a:prstGeom>
         </p:spPr>
@@ -3828,15 +3783,11 @@
             <a:pPr algn="ctr"/>
             <a:r>
               <a:rPr lang="fr-FR" dirty="0" smtClean="0"/>
-              <a:t>Select </a:t>
-            </a:r>
-            <a:r>
-              <a:rPr lang="fr-FR" dirty="0" err="1" smtClean="0"/>
-              <a:t>Sign</a:t>
-            </a:r>
-            <a:r>
-              <a:rPr lang="fr-FR" dirty="0" smtClean="0"/>
-              <a:t>-up</a:t>
+              <a:t>Access </a:t>
+            </a:r>
+            <a:r>
+              <a:rPr lang="fr-FR" dirty="0" smtClean="0"/>
+              <a:t>code?</a:t>
             </a:r>
             <a:endParaRPr lang="fr-FR" dirty="0"/>
           </a:p>
@@ -3844,17 +3795,177 @@
       </p:sp>
       <p:cxnSp>
         <p:nvCxnSpPr>
-          <p:cNvPr id="50" name="Straight Arrow Connector 49"/>
+          <p:cNvPr id="49" name="Straight Arrow Connector 48"/>
           <p:cNvCxnSpPr>
-            <a:stCxn id="40" idx="3"/>
-            <a:endCxn id="6" idx="1"/>
+            <a:stCxn id="6" idx="1"/>
+            <a:endCxn id="2" idx="3"/>
           </p:cNvCxnSpPr>
           <p:nvPr/>
         </p:nvCxnSpPr>
         <p:spPr>
-          <a:xfrm>
-            <a:off x="6896472" y="4340197"/>
-            <a:ext cx="601609" cy="0"/>
+          <a:xfrm flipH="1">
+            <a:off x="8567740" y="3333576"/>
+            <a:ext cx="1110704" cy="36886"/>
+          </a:xfrm>
+          <a:prstGeom prst="straightConnector1">
+            <a:avLst/>
+          </a:prstGeom>
+          <a:ln>
+            <a:tailEnd type="triangle"/>
+          </a:ln>
+        </p:spPr>
+        <p:style>
+          <a:lnRef idx="1">
+            <a:schemeClr val="accent1"/>
+          </a:lnRef>
+          <a:fillRef idx="0">
+            <a:schemeClr val="accent1"/>
+          </a:fillRef>
+          <a:effectRef idx="0">
+            <a:schemeClr val="accent1"/>
+          </a:effectRef>
+          <a:fontRef idx="minor">
+            <a:schemeClr val="tx1"/>
+          </a:fontRef>
+        </p:style>
+      </p:cxnSp>
+      <p:sp>
+        <p:nvSpPr>
+          <p:cNvPr id="56" name="Rectangle 55"/>
+          <p:cNvSpPr/>
+          <p:nvPr/>
+        </p:nvSpPr>
+        <p:spPr>
+          <a:xfrm>
+            <a:off x="3282882" y="2967831"/>
+            <a:ext cx="2220014" cy="805260"/>
+          </a:xfrm>
+          <a:prstGeom prst="rect">
+            <a:avLst/>
+          </a:prstGeom>
+        </p:spPr>
+        <p:style>
+          <a:lnRef idx="2">
+            <a:schemeClr val="accent1">
+              <a:shade val="50000"/>
+            </a:schemeClr>
+          </a:lnRef>
+          <a:fillRef idx="1">
+            <a:schemeClr val="accent1"/>
+          </a:fillRef>
+          <a:effectRef idx="0">
+            <a:schemeClr val="accent1"/>
+          </a:effectRef>
+          <a:fontRef idx="minor">
+            <a:schemeClr val="lt1"/>
+          </a:fontRef>
+        </p:style>
+        <p:txBody>
+          <a:bodyPr rtlCol="0" anchor="ctr"/>
+          <a:lstStyle/>
+          <a:p>
+            <a:pPr algn="ctr"/>
+            <a:r>
+              <a:rPr lang="en-US" dirty="0" smtClean="0"/>
+              <a:t>Show all messages in Inbox and title of tests</a:t>
+            </a:r>
+            <a:endParaRPr lang="fr-FR" dirty="0"/>
+          </a:p>
+        </p:txBody>
+      </p:sp>
+      <p:cxnSp>
+        <p:nvCxnSpPr>
+          <p:cNvPr id="58" name="Straight Arrow Connector 57"/>
+          <p:cNvCxnSpPr>
+            <a:stCxn id="2" idx="1"/>
+            <a:endCxn id="56" idx="3"/>
+          </p:cNvCxnSpPr>
+          <p:nvPr/>
+        </p:nvCxnSpPr>
+        <p:spPr>
+          <a:xfrm flipH="1" flipV="1">
+            <a:off x="5502896" y="3370461"/>
+            <a:ext cx="823148" cy="1"/>
+          </a:xfrm>
+          <a:prstGeom prst="straightConnector1">
+            <a:avLst/>
+          </a:prstGeom>
+          <a:ln>
+            <a:tailEnd type="triangle"/>
+          </a:ln>
+        </p:spPr>
+        <p:style>
+          <a:lnRef idx="1">
+            <a:schemeClr val="accent1"/>
+          </a:lnRef>
+          <a:fillRef idx="0">
+            <a:schemeClr val="accent1"/>
+          </a:fillRef>
+          <a:effectRef idx="0">
+            <a:schemeClr val="accent1"/>
+          </a:effectRef>
+          <a:fontRef idx="minor">
+            <a:schemeClr val="tx1"/>
+          </a:fontRef>
+        </p:style>
+      </p:cxnSp>
+      <p:sp>
+        <p:nvSpPr>
+          <p:cNvPr id="59" name="Rectangle 58"/>
+          <p:cNvSpPr/>
+          <p:nvPr/>
+        </p:nvSpPr>
+        <p:spPr>
+          <a:xfrm>
+            <a:off x="6347726" y="4676335"/>
+            <a:ext cx="2220014" cy="805260"/>
+          </a:xfrm>
+          <a:prstGeom prst="rect">
+            <a:avLst/>
+          </a:prstGeom>
+        </p:spPr>
+        <p:style>
+          <a:lnRef idx="2">
+            <a:schemeClr val="accent1">
+              <a:shade val="50000"/>
+            </a:schemeClr>
+          </a:lnRef>
+          <a:fillRef idx="1">
+            <a:schemeClr val="accent1"/>
+          </a:fillRef>
+          <a:effectRef idx="0">
+            <a:schemeClr val="accent1"/>
+          </a:effectRef>
+          <a:fontRef idx="minor">
+            <a:schemeClr val="lt1"/>
+          </a:fontRef>
+        </p:style>
+        <p:txBody>
+          <a:bodyPr rtlCol="0" anchor="ctr"/>
+          <a:lstStyle/>
+          <a:p>
+            <a:pPr algn="ctr"/>
+            <a:r>
+              <a:rPr lang="en-US" dirty="0" smtClean="0"/>
+              <a:t>Show list of classes to apply for</a:t>
+            </a:r>
+            <a:endParaRPr lang="fr-FR" dirty="0"/>
+          </a:p>
+        </p:txBody>
+      </p:sp>
+      <p:cxnSp>
+        <p:nvCxnSpPr>
+          <p:cNvPr id="62" name="Straight Arrow Connector 61"/>
+          <p:cNvCxnSpPr>
+            <a:stCxn id="2" idx="2"/>
+            <a:endCxn id="59" idx="0"/>
+          </p:cNvCxnSpPr>
+          <p:nvPr/>
+        </p:nvCxnSpPr>
+        <p:spPr>
+          <a:xfrm>
+            <a:off x="7446892" y="4153797"/>
+            <a:ext cx="10841" cy="522538"/>
           </a:xfrm>
           <a:prstGeom prst="straightConnector1">
             <a:avLst/>
@@ -4456,8 +4567,8 @@
           <a:p>
             <a:pPr algn="ctr"/>
             <a:r>
-              <a:rPr lang="fr-FR" dirty="0" err="1" smtClean="0"/>
-              <a:t>Exercises</a:t>
+              <a:rPr lang="fr-FR" dirty="0" smtClean="0"/>
+              <a:t>Test</a:t>
             </a:r>
             <a:endParaRPr lang="fr-FR" dirty="0"/>
           </a:p>
@@ -4697,7 +4808,7 @@
             <a:pPr algn="ctr"/>
             <a:r>
               <a:rPr lang="fr-FR" altLang="zh-CN" dirty="0" smtClean="0"/>
-              <a:t>FAQ</a:t>
+              <a:t>Q &amp; A</a:t>
             </a:r>
             <a:endParaRPr lang="fr-FR" dirty="0"/>
           </a:p>
@@ -4792,12 +4903,8 @@
           <a:lstStyle/>
           <a:p>
             <a:r>
-              <a:rPr lang="fr-FR" dirty="0" err="1" smtClean="0"/>
-              <a:t>Exercises</a:t>
-            </a:r>
-            <a:r>
-              <a:rPr lang="fr-FR" dirty="0" smtClean="0"/>
-              <a:t> flow</a:t>
+              <a:rPr lang="fr-FR" dirty="0" smtClean="0"/>
+              <a:t>Test flow</a:t>
             </a:r>
             <a:endParaRPr lang="fr-FR" dirty="0"/>
           </a:p>
@@ -4844,12 +4951,8 @@
               <a:t>Select </a:t>
             </a:r>
             <a:r>
-              <a:rPr lang="fr-FR" dirty="0" err="1" smtClean="0"/>
-              <a:t>Exercises</a:t>
-            </a:r>
-            <a:r>
-              <a:rPr lang="fr-FR" dirty="0" smtClean="0"/>
-              <a:t> tab</a:t>
+              <a:rPr lang="fr-FR" dirty="0" smtClean="0"/>
+              <a:t>Test tab</a:t>
             </a:r>
             <a:endParaRPr lang="fr-FR" dirty="0"/>
           </a:p>
@@ -4863,8 +4966,8 @@
         </p:nvSpPr>
         <p:spPr>
           <a:xfrm>
-            <a:off x="3041870" y="2413954"/>
-            <a:ext cx="1597152" cy="755904"/>
+            <a:off x="3007632" y="2292127"/>
+            <a:ext cx="1871506" cy="1024066"/>
           </a:xfrm>
           <a:prstGeom prst="rect">
             <a:avLst/>
@@ -4892,12 +4995,24 @@
           <a:p>
             <a:pPr algn="ctr"/>
             <a:r>
-              <a:rPr lang="fr-FR" dirty="0" err="1" smtClean="0"/>
-              <a:t>Pick</a:t>
-            </a:r>
-            <a:r>
-              <a:rPr lang="fr-FR" dirty="0" smtClean="0"/>
-              <a:t> a group</a:t>
+              <a:rPr lang="fr-FR" dirty="0" smtClean="0"/>
+              <a:t>Select a </a:t>
+            </a:r>
+            <a:r>
+              <a:rPr lang="fr-FR" dirty="0" err="1" smtClean="0"/>
+              <a:t>sequence</a:t>
+            </a:r>
+            <a:r>
+              <a:rPr lang="fr-FR" dirty="0" smtClean="0"/>
+              <a:t> of </a:t>
+            </a:r>
+            <a:r>
+              <a:rPr lang="fr-FR" dirty="0" err="1" smtClean="0"/>
+              <a:t>exercises</a:t>
+            </a:r>
+            <a:r>
+              <a:rPr lang="fr-FR" dirty="0" smtClean="0"/>
+              <a:t> or an exam </a:t>
             </a:r>
             <a:endParaRPr lang="fr-FR" dirty="0"/>
           </a:p>
@@ -5125,7 +5240,11 @@
             <a:pPr algn="ctr"/>
             <a:r>
               <a:rPr lang="fr-FR" dirty="0" smtClean="0"/>
-              <a:t>Check score and </a:t>
+              <a:t>Check </a:t>
+            </a:r>
+            <a:r>
+              <a:rPr lang="fr-FR" dirty="0" smtClean="0"/>
+              <a:t>score and </a:t>
             </a:r>
             <a:r>
               <a:rPr lang="fr-FR" dirty="0" err="1" smtClean="0"/>
@@ -5147,7 +5266,7 @@
         <p:spPr>
           <a:xfrm>
             <a:off x="2435352" y="2785555"/>
-            <a:ext cx="606518" cy="6351"/>
+            <a:ext cx="572280" cy="18605"/>
           </a:xfrm>
           <a:prstGeom prst="straightConnector1">
             <a:avLst/>
@@ -5181,9 +5300,9 @@
           <p:nvPr/>
         </p:nvCxnSpPr>
         <p:spPr>
-          <a:xfrm>
-            <a:off x="4639022" y="2791906"/>
-            <a:ext cx="635508" cy="0"/>
+          <a:xfrm flipV="1">
+            <a:off x="4879138" y="2791906"/>
+            <a:ext cx="395392" cy="12254"/>
           </a:xfrm>
           <a:prstGeom prst="straightConnector1">
             <a:avLst/>
@@ -5392,18 +5511,18 @@
           <p:cNvPr id="68" name="Elbow Connector 67"/>
           <p:cNvCxnSpPr>
             <a:stCxn id="9" idx="0"/>
-            <a:endCxn id="5" idx="0"/>
+            <a:endCxn id="4" idx="0"/>
           </p:cNvCxnSpPr>
           <p:nvPr/>
         </p:nvCxnSpPr>
         <p:spPr>
           <a:xfrm rot="16200000" flipV="1">
-            <a:off x="8573228" y="-86168"/>
-            <a:ext cx="12700" cy="5000244"/>
+            <a:off x="7447455" y="-1211942"/>
+            <a:ext cx="121827" cy="7129965"/>
           </a:xfrm>
           <a:prstGeom prst="bentConnector3">
             <a:avLst>
-              <a:gd name="adj1" fmla="val 4872000"/>
+              <a:gd name="adj1" fmla="val 487796"/>
             </a:avLst>
           </a:prstGeom>
           <a:ln>
@@ -5496,7 +5615,7 @@
             </a:r>
             <a:r>
               <a:rPr lang="fr-FR" sz="3600" dirty="0" smtClean="0"/>
-              <a:t> Pri1, </a:t>
+              <a:t>, </a:t>
             </a:r>
             <a:r>
               <a:rPr lang="fr-FR" sz="3600" dirty="0" err="1" smtClean="0"/>
@@ -5504,7 +5623,19 @@
             </a:r>
             <a:r>
               <a:rPr lang="fr-FR" sz="3600" dirty="0" smtClean="0"/>
-              <a:t> Pri2</a:t>
+              <a:t> </a:t>
+            </a:r>
+            <a:r>
+              <a:rPr lang="fr-FR" sz="3600" dirty="0" smtClean="0"/>
+              <a:t>(no </a:t>
+            </a:r>
+            <a:r>
+              <a:rPr lang="fr-FR" sz="3600" dirty="0" err="1" smtClean="0"/>
+              <a:t>reply</a:t>
+            </a:r>
+            <a:r>
+              <a:rPr lang="fr-FR" sz="3600" dirty="0" smtClean="0"/>
+              <a:t>)</a:t>
             </a:r>
             <a:endParaRPr lang="fr-FR" sz="3600" dirty="0"/>
           </a:p>
@@ -5518,7 +5649,7 @@
         </p:nvSpPr>
         <p:spPr>
           <a:xfrm>
-            <a:off x="1070038" y="2834640"/>
+            <a:off x="1155382" y="3468624"/>
             <a:ext cx="1826895" cy="1194816"/>
           </a:xfrm>
           <a:prstGeom prst="rect">
@@ -5570,7 +5701,7 @@
         </p:nvSpPr>
         <p:spPr>
           <a:xfrm>
-            <a:off x="4260342" y="2834640"/>
+            <a:off x="4345686" y="3468624"/>
             <a:ext cx="2458593" cy="1194816"/>
           </a:xfrm>
           <a:prstGeom prst="rect">
@@ -5653,7 +5784,7 @@
         </p:nvCxnSpPr>
         <p:spPr>
           <a:xfrm>
-            <a:off x="2896933" y="3432048"/>
+            <a:off x="2982277" y="4066032"/>
             <a:ext cx="1363409" cy="0"/>
           </a:xfrm>
           <a:prstGeom prst="straightConnector1">
@@ -5686,12 +5817,15 @@
         </p:nvSpPr>
         <p:spPr>
           <a:xfrm>
-            <a:off x="8995791" y="2523744"/>
+            <a:off x="9081135" y="3694176"/>
             <a:ext cx="1645920" cy="908304"/>
           </a:xfrm>
           <a:prstGeom prst="rect">
             <a:avLst/>
           </a:prstGeom>
+          <a:solidFill>
+            <a:srgbClr val="FF0000"/>
+          </a:solidFill>
         </p:spPr>
         <p:style>
           <a:lnRef idx="2">
@@ -5738,12 +5872,15 @@
         </p:nvSpPr>
         <p:spPr>
           <a:xfrm>
-            <a:off x="8995791" y="3785616"/>
+            <a:off x="9081135" y="4899088"/>
             <a:ext cx="1645920" cy="908304"/>
           </a:xfrm>
           <a:prstGeom prst="rect">
             <a:avLst/>
           </a:prstGeom>
+          <a:solidFill>
+            <a:srgbClr val="FF0000"/>
+          </a:solidFill>
         </p:spPr>
         <p:style>
           <a:lnRef idx="2">
@@ -5792,9 +5929,9 @@
           <p:nvPr/>
         </p:nvCxnSpPr>
         <p:spPr>
-          <a:xfrm flipV="1">
-            <a:off x="6718935" y="2977896"/>
-            <a:ext cx="2276856" cy="454152"/>
+          <a:xfrm>
+            <a:off x="6804279" y="4066032"/>
+            <a:ext cx="2276856" cy="82296"/>
           </a:xfrm>
           <a:prstGeom prst="straightConnector1">
             <a:avLst/>
@@ -5829,8 +5966,96 @@
         </p:nvCxnSpPr>
         <p:spPr>
           <a:xfrm>
-            <a:off x="6718935" y="3432048"/>
-            <a:ext cx="2276856" cy="807720"/>
+            <a:off x="6804279" y="4066032"/>
+            <a:ext cx="2276856" cy="1287208"/>
+          </a:xfrm>
+          <a:prstGeom prst="straightConnector1">
+            <a:avLst/>
+          </a:prstGeom>
+          <a:ln>
+            <a:tailEnd type="triangle"/>
+          </a:ln>
+        </p:spPr>
+        <p:style>
+          <a:lnRef idx="1">
+            <a:schemeClr val="accent1"/>
+          </a:lnRef>
+          <a:fillRef idx="0">
+            <a:schemeClr val="accent1"/>
+          </a:fillRef>
+          <a:effectRef idx="0">
+            <a:schemeClr val="accent1"/>
+          </a:effectRef>
+          <a:fontRef idx="minor">
+            <a:schemeClr val="tx1"/>
+          </a:fontRef>
+        </p:style>
+      </p:cxnSp>
+      <p:sp>
+        <p:nvSpPr>
+          <p:cNvPr id="10" name="Rectangle 9"/>
+          <p:cNvSpPr/>
+          <p:nvPr/>
+        </p:nvSpPr>
+        <p:spPr>
+          <a:xfrm>
+            <a:off x="9081135" y="2072640"/>
+            <a:ext cx="1645920" cy="908304"/>
+          </a:xfrm>
+          <a:prstGeom prst="rect">
+            <a:avLst/>
+          </a:prstGeom>
+        </p:spPr>
+        <p:style>
+          <a:lnRef idx="2">
+            <a:schemeClr val="accent1">
+              <a:shade val="50000"/>
+            </a:schemeClr>
+          </a:lnRef>
+          <a:fillRef idx="1">
+            <a:schemeClr val="accent1"/>
+          </a:fillRef>
+          <a:effectRef idx="0">
+            <a:schemeClr val="accent1"/>
+          </a:effectRef>
+          <a:fontRef idx="minor">
+            <a:schemeClr val="lt1"/>
+          </a:fontRef>
+        </p:style>
+        <p:txBody>
+          <a:bodyPr rtlCol="0" anchor="ctr"/>
+          <a:lstStyle/>
+          <a:p>
+            <a:pPr algn="ctr"/>
+            <a:r>
+              <a:rPr lang="fr-FR" dirty="0" smtClean="0"/>
+              <a:t>Flag a message </a:t>
+            </a:r>
+            <a:r>
+              <a:rPr lang="en-US" dirty="0" smtClean="0"/>
+              <a:t>as high priority to </a:t>
+            </a:r>
+            <a:r>
+              <a:rPr lang="zh-CN" altLang="fr-FR" dirty="0" smtClean="0"/>
+              <a:t>置顶</a:t>
+            </a:r>
+            <a:endParaRPr lang="fr-FR" dirty="0"/>
+          </a:p>
+        </p:txBody>
+      </p:sp>
+      <p:cxnSp>
+        <p:nvCxnSpPr>
+          <p:cNvPr id="14" name="Straight Arrow Connector 13"/>
+          <p:cNvCxnSpPr>
+            <a:stCxn id="5" idx="3"/>
+            <a:endCxn id="10" idx="1"/>
+          </p:cNvCxnSpPr>
+          <p:nvPr/>
+        </p:nvCxnSpPr>
+        <p:spPr>
+          <a:xfrm flipV="1">
+            <a:off x="6804279" y="2526792"/>
+            <a:ext cx="2276856" cy="1539240"/>
           </a:xfrm>
           <a:prstGeom prst="straightConnector1">
             <a:avLst/>
@@ -5913,7 +6138,11 @@
           <a:p>
             <a:r>
               <a:rPr lang="fr-FR" dirty="0" smtClean="0"/>
-              <a:t>Class info – Pri2</a:t>
+              <a:t>Clas</a:t>
+            </a:r>
+            <a:r>
+              <a:rPr lang="fr-FR" altLang="zh-CN" dirty="0" smtClean="0"/>
+              <a:t>s</a:t>
             </a:r>
             <a:endParaRPr lang="fr-FR" dirty="0"/>
           </a:p>
@@ -5958,70 +6187,6 @@
             <a:r>
               <a:rPr lang="fr-FR" dirty="0" smtClean="0"/>
               <a:t>Select Class tab</a:t>
-            </a:r>
-            <a:endParaRPr lang="fr-FR" dirty="0"/>
-          </a:p>
-        </p:txBody>
-      </p:sp>
-      <p:sp>
-        <p:nvSpPr>
-          <p:cNvPr id="5" name="Rectangle 4"/>
-          <p:cNvSpPr/>
-          <p:nvPr/>
-        </p:nvSpPr>
-        <p:spPr>
-          <a:xfrm>
-            <a:off x="4477512" y="2445630"/>
-            <a:ext cx="1994916" cy="1194816"/>
-          </a:xfrm>
-          <a:prstGeom prst="rect">
-            <a:avLst/>
-          </a:prstGeom>
-        </p:spPr>
-        <p:style>
-          <a:lnRef idx="2">
-            <a:schemeClr val="accent1">
-              <a:shade val="50000"/>
-            </a:schemeClr>
-          </a:lnRef>
-          <a:fillRef idx="1">
-            <a:schemeClr val="accent1"/>
-          </a:fillRef>
-          <a:effectRef idx="0">
-            <a:schemeClr val="accent1"/>
-          </a:effectRef>
-          <a:fontRef idx="minor">
-            <a:schemeClr val="lt1"/>
-          </a:fontRef>
-        </p:style>
-        <p:txBody>
-          <a:bodyPr rtlCol="0" anchor="ctr"/>
-          <a:lstStyle/>
-          <a:p>
-            <a:pPr algn="ctr"/>
-            <a:r>
-              <a:rPr lang="fr-FR" dirty="0" err="1" smtClean="0"/>
-              <a:t>View</a:t>
-            </a:r>
-            <a:r>
-              <a:rPr lang="fr-FR" dirty="0" smtClean="0"/>
-              <a:t> </a:t>
-            </a:r>
-            <a:r>
-              <a:rPr lang="fr-FR" dirty="0" err="1" smtClean="0"/>
-              <a:t>list</a:t>
-            </a:r>
-            <a:r>
-              <a:rPr lang="fr-FR" dirty="0" smtClean="0"/>
-              <a:t> of classes (public and </a:t>
-            </a:r>
-            <a:r>
-              <a:rPr lang="fr-FR" dirty="0" err="1" smtClean="0"/>
-              <a:t>private</a:t>
-            </a:r>
-            <a:r>
-              <a:rPr lang="fr-FR" dirty="0" smtClean="0"/>
-              <a:t>)</a:t>
             </a:r>
             <a:endParaRPr lang="fr-FR" dirty="0"/>
           </a:p>
@@ -6038,8 +6203,8 @@
         </p:nvCxnSpPr>
         <p:spPr>
           <a:xfrm flipV="1">
-            <a:off x="1881378" y="3043039"/>
-            <a:ext cx="500634" cy="3485"/>
+            <a:off x="1881378" y="3036964"/>
+            <a:ext cx="445962" cy="9560"/>
           </a:xfrm>
           <a:prstGeom prst="straightConnector1">
             <a:avLst/>
@@ -6071,7 +6236,7 @@
         </p:nvSpPr>
         <p:spPr>
           <a:xfrm>
-            <a:off x="7543038" y="1778968"/>
+            <a:off x="4690111" y="3298914"/>
             <a:ext cx="1994916" cy="1194816"/>
           </a:xfrm>
           <a:prstGeom prst="rect">
@@ -6101,27 +6266,31 @@
             <a:pPr algn="ctr"/>
             <a:r>
               <a:rPr lang="fr-FR" altLang="zh-CN" dirty="0" smtClean="0"/>
-              <a:t>For public classes, show </a:t>
+              <a:t>For </a:t>
+            </a:r>
+            <a:r>
+              <a:rPr lang="fr-FR" altLang="zh-CN" dirty="0" smtClean="0"/>
+              <a:t>classes </a:t>
             </a:r>
             <a:r>
               <a:rPr lang="fr-FR" altLang="zh-CN" dirty="0" err="1" smtClean="0"/>
-              <a:t>teacher</a:t>
+              <a:t>joined</a:t>
             </a:r>
             <a:r>
               <a:rPr lang="fr-FR" altLang="zh-CN" dirty="0" smtClean="0"/>
-              <a:t> and </a:t>
+              <a:t>, show </a:t>
             </a:r>
             <a:r>
               <a:rPr lang="fr-FR" altLang="zh-CN" dirty="0" err="1" smtClean="0"/>
-              <a:t>list</a:t>
+              <a:t>joined</a:t>
             </a:r>
             <a:r>
               <a:rPr lang="fr-FR" altLang="zh-CN" dirty="0" smtClean="0"/>
-              <a:t> of </a:t>
+              <a:t> </a:t>
             </a:r>
             <a:r>
               <a:rPr lang="fr-FR" altLang="zh-CN" dirty="0" err="1" smtClean="0"/>
-              <a:t>students</a:t>
+              <a:t>status</a:t>
             </a:r>
             <a:endParaRPr lang="fr-FR" dirty="0"/>
           </a:p>
@@ -6131,15 +6300,15 @@
         <p:nvCxnSpPr>
           <p:cNvPr id="8" name="Straight Arrow Connector 7"/>
           <p:cNvCxnSpPr>
-            <a:stCxn id="5" idx="3"/>
+            <a:stCxn id="28" idx="3"/>
             <a:endCxn id="6" idx="1"/>
           </p:cNvCxnSpPr>
           <p:nvPr/>
         </p:nvCxnSpPr>
         <p:spPr>
-          <a:xfrm flipV="1">
-            <a:off x="6472428" y="2376376"/>
-            <a:ext cx="1070610" cy="666662"/>
+          <a:xfrm>
+            <a:off x="3894393" y="3036964"/>
+            <a:ext cx="795718" cy="859358"/>
           </a:xfrm>
           <a:prstGeom prst="straightConnector1">
             <a:avLst/>
@@ -6171,7 +6340,7 @@
         </p:nvSpPr>
         <p:spPr>
           <a:xfrm>
-            <a:off x="7522464" y="3396933"/>
+            <a:off x="4879278" y="1504897"/>
             <a:ext cx="1994916" cy="1194816"/>
           </a:xfrm>
           <a:prstGeom prst="rect">
@@ -6204,16 +6373,32 @@
               <a:t>For </a:t>
             </a:r>
             <a:r>
+              <a:rPr lang="fr-FR" altLang="zh-CN" dirty="0" smtClean="0"/>
+              <a:t>classes NOT </a:t>
+            </a:r>
+            <a:r>
               <a:rPr lang="fr-FR" altLang="zh-CN" dirty="0" err="1" smtClean="0"/>
-              <a:t>privtae</a:t>
+              <a:t>joined</a:t>
             </a:r>
             <a:r>
               <a:rPr lang="fr-FR" altLang="zh-CN" dirty="0" smtClean="0"/>
-              <a:t> classes, show </a:t>
+              <a:t>, </a:t>
             </a:r>
             <a:r>
               <a:rPr lang="fr-FR" altLang="zh-CN" dirty="0" err="1" smtClean="0"/>
-              <a:t>teacher</a:t>
+              <a:t>ask</a:t>
+            </a:r>
+            <a:r>
+              <a:rPr lang="fr-FR" altLang="zh-CN" dirty="0" smtClean="0"/>
+              <a:t> for </a:t>
+            </a:r>
+            <a:r>
+              <a:rPr lang="fr-FR" altLang="zh-CN" dirty="0" err="1" smtClean="0"/>
+              <a:t>access</a:t>
+            </a:r>
+            <a:r>
+              <a:rPr lang="fr-FR" altLang="zh-CN" dirty="0" smtClean="0"/>
+              <a:t> code</a:t>
             </a:r>
             <a:endParaRPr lang="fr-FR" dirty="0"/>
           </a:p>
@@ -6223,15 +6408,15 @@
         <p:nvCxnSpPr>
           <p:cNvPr id="14" name="Straight Arrow Connector 13"/>
           <p:cNvCxnSpPr>
-            <a:stCxn id="5" idx="3"/>
+            <a:stCxn id="28" idx="3"/>
             <a:endCxn id="12" idx="1"/>
           </p:cNvCxnSpPr>
           <p:nvPr/>
         </p:nvCxnSpPr>
         <p:spPr>
-          <a:xfrm>
-            <a:off x="6472428" y="3043038"/>
-            <a:ext cx="1050036" cy="951303"/>
+          <a:xfrm flipV="1">
+            <a:off x="3894393" y="2102305"/>
+            <a:ext cx="984885" cy="934659"/>
           </a:xfrm>
           <a:prstGeom prst="straightConnector1">
             <a:avLst/>
@@ -6263,8 +6448,8 @@
         </p:nvSpPr>
         <p:spPr>
           <a:xfrm>
-            <a:off x="2382012" y="2696511"/>
-            <a:ext cx="1594866" cy="693055"/>
+            <a:off x="2327340" y="2595325"/>
+            <a:ext cx="1567053" cy="883277"/>
           </a:xfrm>
           <a:prstGeom prst="rect">
             <a:avLst/>
@@ -6297,70 +6482,42 @@
             </a:r>
             <a:r>
               <a:rPr lang="fr-FR" dirty="0" err="1" smtClean="0"/>
-              <a:t>my</a:t>
+              <a:t>list</a:t>
+            </a:r>
+            <a:r>
+              <a:rPr lang="fr-FR" dirty="0" smtClean="0"/>
+              <a:t> o</a:t>
+            </a:r>
+            <a:r>
+              <a:rPr lang="fr-FR" dirty="0" smtClean="0"/>
+              <a:t>f </a:t>
+            </a:r>
+            <a:r>
+              <a:rPr lang="fr-FR" dirty="0" err="1" smtClean="0"/>
+              <a:t>available</a:t>
             </a:r>
             <a:r>
               <a:rPr lang="fr-FR" dirty="0" smtClean="0"/>
               <a:t> </a:t>
             </a:r>
             <a:r>
-              <a:rPr lang="fr-FR" dirty="0" err="1" smtClean="0"/>
-              <a:t>joined</a:t>
-            </a:r>
-            <a:r>
-              <a:rPr lang="fr-FR" dirty="0" smtClean="0"/>
-              <a:t> classes</a:t>
+              <a:rPr lang="fr-FR" dirty="0" smtClean="0"/>
+              <a:t>classes</a:t>
             </a:r>
             <a:endParaRPr lang="fr-FR" dirty="0"/>
           </a:p>
         </p:txBody>
       </p:sp>
-      <p:cxnSp>
-        <p:nvCxnSpPr>
-          <p:cNvPr id="33" name="Straight Arrow Connector 32"/>
-          <p:cNvCxnSpPr>
-            <a:stCxn id="28" idx="3"/>
-            <a:endCxn id="5" idx="1"/>
-          </p:cNvCxnSpPr>
-          <p:nvPr/>
-        </p:nvCxnSpPr>
-        <p:spPr>
-          <a:xfrm flipV="1">
-            <a:off x="3976878" y="3043038"/>
-            <a:ext cx="500634" cy="1"/>
-          </a:xfrm>
-          <a:prstGeom prst="straightConnector1">
-            <a:avLst/>
-          </a:prstGeom>
-          <a:ln>
-            <a:tailEnd type="triangle"/>
-          </a:ln>
-        </p:spPr>
-        <p:style>
-          <a:lnRef idx="1">
-            <a:schemeClr val="accent1"/>
-          </a:lnRef>
-          <a:fillRef idx="0">
-            <a:schemeClr val="accent1"/>
-          </a:fillRef>
-          <a:effectRef idx="0">
-            <a:schemeClr val="accent1"/>
-          </a:effectRef>
-          <a:fontRef idx="minor">
-            <a:schemeClr val="tx1"/>
-          </a:fontRef>
-        </p:style>
-      </p:cxnSp>
-      <p:sp>
-        <p:nvSpPr>
-          <p:cNvPr id="53" name="Rectangle 52"/>
+      <p:sp>
+        <p:nvSpPr>
+          <p:cNvPr id="64" name="Rectangle 63"/>
           <p:cNvSpPr/>
           <p:nvPr/>
         </p:nvSpPr>
         <p:spPr>
           <a:xfrm>
-            <a:off x="10338816" y="2077672"/>
-            <a:ext cx="1621536" cy="597408"/>
+            <a:off x="9674545" y="2367816"/>
+            <a:ext cx="1816608" cy="1020557"/>
           </a:xfrm>
           <a:prstGeom prst="rect">
             <a:avLst/>
@@ -6388,160 +6545,24 @@
           <a:p>
             <a:pPr algn="ctr"/>
             <a:r>
-              <a:rPr lang="fr-FR" dirty="0" smtClean="0"/>
-              <a:t>Auto-</a:t>
+              <a:rPr lang="fr-FR" dirty="0" err="1" smtClean="0"/>
+              <a:t>Send</a:t>
+            </a:r>
+            <a:r>
+              <a:rPr lang="fr-FR" dirty="0" smtClean="0"/>
+              <a:t> </a:t>
+            </a:r>
+            <a:r>
+              <a:rPr lang="fr-FR" dirty="0" err="1" smtClean="0"/>
+              <a:t>request</a:t>
+            </a:r>
+            <a:r>
+              <a:rPr lang="fr-FR" dirty="0" smtClean="0"/>
+              <a:t> to </a:t>
             </a:r>
             <a:r>
               <a:rPr lang="fr-FR" dirty="0" err="1" smtClean="0"/>
               <a:t>join</a:t>
-            </a:r>
-            <a:endParaRPr lang="fr-FR" dirty="0"/>
-          </a:p>
-        </p:txBody>
-      </p:sp>
-      <p:cxnSp>
-        <p:nvCxnSpPr>
-          <p:cNvPr id="55" name="Straight Arrow Connector 54"/>
-          <p:cNvCxnSpPr>
-            <a:stCxn id="6" idx="3"/>
-            <a:endCxn id="53" idx="1"/>
-          </p:cNvCxnSpPr>
-          <p:nvPr/>
-        </p:nvCxnSpPr>
-        <p:spPr>
-          <a:xfrm>
-            <a:off x="9537954" y="2376376"/>
-            <a:ext cx="800862" cy="0"/>
-          </a:xfrm>
-          <a:prstGeom prst="straightConnector1">
-            <a:avLst/>
-          </a:prstGeom>
-          <a:ln>
-            <a:tailEnd type="triangle"/>
-          </a:ln>
-        </p:spPr>
-        <p:style>
-          <a:lnRef idx="1">
-            <a:schemeClr val="accent1"/>
-          </a:lnRef>
-          <a:fillRef idx="0">
-            <a:schemeClr val="accent1"/>
-          </a:fillRef>
-          <a:effectRef idx="0">
-            <a:schemeClr val="accent1"/>
-          </a:effectRef>
-          <a:fontRef idx="minor">
-            <a:schemeClr val="tx1"/>
-          </a:fontRef>
-        </p:style>
-      </p:cxnSp>
-      <p:sp>
-        <p:nvSpPr>
-          <p:cNvPr id="64" name="Rectangle 63"/>
-          <p:cNvSpPr/>
-          <p:nvPr/>
-        </p:nvSpPr>
-        <p:spPr>
-          <a:xfrm>
-            <a:off x="10217659" y="3426349"/>
-            <a:ext cx="1816608" cy="1020557"/>
-          </a:xfrm>
-          <a:prstGeom prst="rect">
-            <a:avLst/>
-          </a:prstGeom>
-        </p:spPr>
-        <p:style>
-          <a:lnRef idx="2">
-            <a:schemeClr val="accent1">
-              <a:shade val="50000"/>
-            </a:schemeClr>
-          </a:lnRef>
-          <a:fillRef idx="1">
-            <a:schemeClr val="accent1"/>
-          </a:fillRef>
-          <a:effectRef idx="0">
-            <a:schemeClr val="accent1"/>
-          </a:effectRef>
-          <a:fontRef idx="minor">
-            <a:schemeClr val="lt1"/>
-          </a:fontRef>
-        </p:style>
-        <p:txBody>
-          <a:bodyPr rtlCol="0" anchor="ctr"/>
-          <a:lstStyle/>
-          <a:p>
-            <a:pPr algn="ctr"/>
-            <a:r>
-              <a:rPr lang="fr-FR" dirty="0" err="1" smtClean="0"/>
-              <a:t>Send</a:t>
-            </a:r>
-            <a:r>
-              <a:rPr lang="fr-FR" dirty="0" smtClean="0"/>
-              <a:t> </a:t>
-            </a:r>
-            <a:r>
-              <a:rPr lang="fr-FR" dirty="0" err="1" smtClean="0"/>
-              <a:t>join</a:t>
-            </a:r>
-            <a:r>
-              <a:rPr lang="fr-FR" dirty="0" smtClean="0"/>
-              <a:t> </a:t>
-            </a:r>
-            <a:r>
-              <a:rPr lang="fr-FR" dirty="0" err="1" smtClean="0"/>
-              <a:t>request</a:t>
-            </a:r>
-            <a:r>
-              <a:rPr lang="fr-FR" dirty="0" smtClean="0"/>
-              <a:t> to </a:t>
-            </a:r>
-            <a:r>
-              <a:rPr lang="fr-FR" dirty="0" err="1" smtClean="0"/>
-              <a:t>teacher</a:t>
-            </a:r>
-            <a:r>
-              <a:rPr lang="fr-FR" dirty="0" smtClean="0"/>
-              <a:t> </a:t>
-            </a:r>
-            <a:r>
-              <a:rPr lang="fr-FR" dirty="0" smtClean="0">
-                <a:solidFill>
-                  <a:srgbClr val="FF0000"/>
-                </a:solidFill>
-              </a:rPr>
-              <a:t>(no </a:t>
-            </a:r>
-            <a:r>
-              <a:rPr lang="fr-FR" dirty="0" err="1" smtClean="0">
-                <a:solidFill>
-                  <a:srgbClr val="FF0000"/>
-                </a:solidFill>
-              </a:rPr>
-              <a:t>access</a:t>
-            </a:r>
-            <a:r>
-              <a:rPr lang="fr-FR" dirty="0" smtClean="0">
-                <a:solidFill>
-                  <a:srgbClr val="FF0000"/>
-                </a:solidFill>
-              </a:rPr>
-              <a:t> code </a:t>
-            </a:r>
-            <a:r>
-              <a:rPr lang="fr-FR" dirty="0" err="1" smtClean="0">
-                <a:solidFill>
-                  <a:srgbClr val="FF0000"/>
-                </a:solidFill>
-              </a:rPr>
-              <a:t>needed</a:t>
-            </a:r>
-            <a:r>
-              <a:rPr lang="fr-FR" dirty="0" smtClean="0">
-                <a:solidFill>
-                  <a:srgbClr val="FF0000"/>
-                </a:solidFill>
-              </a:rPr>
-              <a:t>?)</a:t>
             </a:r>
             <a:endParaRPr lang="fr-FR" dirty="0">
               <a:solidFill>
@@ -6559,7 +6580,7 @@
         </p:nvSpPr>
         <p:spPr>
           <a:xfrm>
-            <a:off x="10189464" y="5313601"/>
+            <a:off x="9674545" y="4055752"/>
             <a:ext cx="1816608" cy="597408"/>
           </a:xfrm>
           <a:prstGeom prst="rect">
@@ -6594,6 +6615,22 @@
             <a:r>
               <a:rPr lang="fr-FR" dirty="0" err="1" smtClean="0"/>
               <a:t>approves</a:t>
+            </a:r>
+            <a:r>
+              <a:rPr lang="fr-FR" dirty="0" smtClean="0"/>
+              <a:t> </a:t>
+            </a:r>
+            <a:r>
+              <a:rPr lang="fr-FR" dirty="0" err="1" smtClean="0"/>
+              <a:t>thru</a:t>
+            </a:r>
+            <a:r>
+              <a:rPr lang="fr-FR" dirty="0" smtClean="0"/>
+              <a:t> admin </a:t>
+            </a:r>
+            <a:r>
+              <a:rPr lang="fr-FR" dirty="0" err="1" smtClean="0"/>
+              <a:t>tool</a:t>
             </a:r>
             <a:r>
               <a:rPr lang="fr-FR" dirty="0" smtClean="0"/>
@@ -6608,14 +6645,14 @@
           <p:cNvPr id="67" name="Straight Arrow Connector 66"/>
           <p:cNvCxnSpPr>
             <a:stCxn id="12" idx="3"/>
-            <a:endCxn id="64" idx="1"/>
+            <a:endCxn id="21" idx="1"/>
           </p:cNvCxnSpPr>
           <p:nvPr/>
         </p:nvCxnSpPr>
         <p:spPr>
           <a:xfrm flipV="1">
-            <a:off x="9517380" y="3936628"/>
-            <a:ext cx="700279" cy="57713"/>
+            <a:off x="6874194" y="2074095"/>
+            <a:ext cx="432054" cy="28210"/>
           </a:xfrm>
           <a:prstGeom prst="straightConnector1">
             <a:avLst/>
@@ -6649,9 +6686,9 @@
           <p:nvPr/>
         </p:nvCxnSpPr>
         <p:spPr>
-          <a:xfrm flipH="1">
-            <a:off x="11097768" y="4446906"/>
-            <a:ext cx="28195" cy="866695"/>
+          <a:xfrm>
+            <a:off x="10582849" y="3388373"/>
+            <a:ext cx="0" cy="667379"/>
           </a:xfrm>
           <a:prstGeom prst="straightConnector1">
             <a:avLst/>
@@ -6675,21 +6712,438 @@
           </a:fontRef>
         </p:style>
       </p:cxnSp>
+      <p:sp>
+        <p:nvSpPr>
+          <p:cNvPr id="21" name="Diamond 20"/>
+          <p:cNvSpPr/>
+          <p:nvPr/>
+        </p:nvSpPr>
+        <p:spPr>
+          <a:xfrm>
+            <a:off x="7306248" y="1490857"/>
+            <a:ext cx="1732027" cy="1166475"/>
+          </a:xfrm>
+          <a:prstGeom prst="diamond">
+            <a:avLst/>
+          </a:prstGeom>
+        </p:spPr>
+        <p:style>
+          <a:lnRef idx="2">
+            <a:schemeClr val="accent1">
+              <a:shade val="50000"/>
+            </a:schemeClr>
+          </a:lnRef>
+          <a:fillRef idx="1">
+            <a:schemeClr val="accent1"/>
+          </a:fillRef>
+          <a:effectRef idx="0">
+            <a:schemeClr val="accent1"/>
+          </a:effectRef>
+          <a:fontRef idx="minor">
+            <a:schemeClr val="lt1"/>
+          </a:fontRef>
+        </p:style>
+        <p:txBody>
+          <a:bodyPr rtlCol="0" anchor="ctr"/>
+          <a:lstStyle/>
+          <a:p>
+            <a:pPr algn="ctr"/>
+            <a:r>
+              <a:rPr lang="fr-FR" dirty="0" err="1" smtClean="0"/>
+              <a:t>With</a:t>
+            </a:r>
+            <a:r>
+              <a:rPr lang="fr-FR" dirty="0" smtClean="0"/>
+              <a:t> </a:t>
+            </a:r>
+            <a:r>
+              <a:rPr lang="fr-FR" dirty="0" err="1" smtClean="0"/>
+              <a:t>access</a:t>
+            </a:r>
+            <a:r>
+              <a:rPr lang="fr-FR" dirty="0" smtClean="0"/>
+              <a:t> cde?</a:t>
+            </a:r>
+            <a:endParaRPr lang="fr-FR" dirty="0"/>
+          </a:p>
+        </p:txBody>
+      </p:sp>
+      <p:sp>
+        <p:nvSpPr>
+          <p:cNvPr id="22" name="Rectangle 21"/>
+          <p:cNvSpPr/>
+          <p:nvPr/>
+        </p:nvSpPr>
+        <p:spPr>
+          <a:xfrm>
+            <a:off x="9644445" y="832710"/>
+            <a:ext cx="1846708" cy="1175478"/>
+          </a:xfrm>
+          <a:prstGeom prst="rect">
+            <a:avLst/>
+          </a:prstGeom>
+        </p:spPr>
+        <p:style>
+          <a:lnRef idx="2">
+            <a:schemeClr val="accent1">
+              <a:shade val="50000"/>
+            </a:schemeClr>
+          </a:lnRef>
+          <a:fillRef idx="1">
+            <a:schemeClr val="accent1"/>
+          </a:fillRef>
+          <a:effectRef idx="0">
+            <a:schemeClr val="accent1"/>
+          </a:effectRef>
+          <a:fontRef idx="minor">
+            <a:schemeClr val="lt1"/>
+          </a:fontRef>
+        </p:style>
+        <p:txBody>
+          <a:bodyPr rtlCol="0" anchor="ctr"/>
+          <a:lstStyle/>
+          <a:p>
+            <a:pPr algn="ctr"/>
+            <a:r>
+              <a:rPr lang="fr-FR" dirty="0" smtClean="0"/>
+              <a:t>Change to </a:t>
+            </a:r>
+            <a:r>
+              <a:rPr lang="fr-FR" dirty="0" err="1" smtClean="0"/>
+              <a:t>Joined</a:t>
+            </a:r>
+            <a:r>
+              <a:rPr lang="fr-FR" dirty="0" smtClean="0"/>
+              <a:t> </a:t>
+            </a:r>
+            <a:r>
+              <a:rPr lang="fr-FR" dirty="0" err="1" smtClean="0"/>
+              <a:t>status</a:t>
+            </a:r>
+            <a:r>
+              <a:rPr lang="fr-FR" dirty="0" smtClean="0"/>
+              <a:t> and </a:t>
+            </a:r>
+            <a:r>
+              <a:rPr lang="fr-FR" dirty="0" err="1" smtClean="0"/>
+              <a:t>download</a:t>
+            </a:r>
+            <a:r>
+              <a:rPr lang="fr-FR" dirty="0" smtClean="0"/>
+              <a:t> </a:t>
+            </a:r>
+            <a:r>
+              <a:rPr lang="fr-FR" dirty="0" err="1" smtClean="0"/>
+              <a:t>list</a:t>
+            </a:r>
+            <a:r>
+              <a:rPr lang="fr-FR" dirty="0" smtClean="0"/>
+              <a:t> of test </a:t>
+            </a:r>
+            <a:r>
+              <a:rPr lang="fr-FR" dirty="0" err="1" smtClean="0"/>
+              <a:t>titles</a:t>
+            </a:r>
+            <a:endParaRPr lang="fr-FR" dirty="0"/>
+          </a:p>
+        </p:txBody>
+      </p:sp>
       <p:cxnSp>
         <p:nvCxnSpPr>
-          <p:cNvPr id="73" name="Elbow Connector 72"/>
+          <p:cNvPr id="36" name="Straight Arrow Connector 35"/>
           <p:cNvCxnSpPr>
-            <a:stCxn id="65" idx="1"/>
-            <a:endCxn id="28" idx="2"/>
+            <a:stCxn id="21" idx="3"/>
+            <a:endCxn id="22" idx="1"/>
           </p:cNvCxnSpPr>
           <p:nvPr/>
         </p:nvCxnSpPr>
         <p:spPr>
-          <a:xfrm rot="10800000">
-            <a:off x="3179446" y="3389567"/>
-            <a:ext cx="7010019" cy="2222739"/>
-          </a:xfrm>
-          <a:prstGeom prst="bentConnector2">
+          <a:xfrm flipV="1">
+            <a:off x="9038275" y="1420449"/>
+            <a:ext cx="606170" cy="653646"/>
+          </a:xfrm>
+          <a:prstGeom prst="straightConnector1">
+            <a:avLst/>
+          </a:prstGeom>
+          <a:ln>
+            <a:tailEnd type="triangle"/>
+          </a:ln>
+        </p:spPr>
+        <p:style>
+          <a:lnRef idx="1">
+            <a:schemeClr val="accent1"/>
+          </a:lnRef>
+          <a:fillRef idx="0">
+            <a:schemeClr val="accent1"/>
+          </a:fillRef>
+          <a:effectRef idx="0">
+            <a:schemeClr val="accent1"/>
+          </a:effectRef>
+          <a:fontRef idx="minor">
+            <a:schemeClr val="tx1"/>
+          </a:fontRef>
+        </p:style>
+      </p:cxnSp>
+      <p:cxnSp>
+        <p:nvCxnSpPr>
+          <p:cNvPr id="38" name="Straight Arrow Connector 37"/>
+          <p:cNvCxnSpPr>
+            <a:stCxn id="21" idx="3"/>
+            <a:endCxn id="64" idx="1"/>
+          </p:cNvCxnSpPr>
+          <p:nvPr/>
+        </p:nvCxnSpPr>
+        <p:spPr>
+          <a:xfrm>
+            <a:off x="9038275" y="2074095"/>
+            <a:ext cx="636270" cy="804000"/>
+          </a:xfrm>
+          <a:prstGeom prst="straightConnector1">
+            <a:avLst/>
+          </a:prstGeom>
+          <a:ln>
+            <a:tailEnd type="triangle"/>
+          </a:ln>
+        </p:spPr>
+        <p:style>
+          <a:lnRef idx="1">
+            <a:schemeClr val="accent1"/>
+          </a:lnRef>
+          <a:fillRef idx="0">
+            <a:schemeClr val="accent1"/>
+          </a:fillRef>
+          <a:effectRef idx="0">
+            <a:schemeClr val="accent1"/>
+          </a:effectRef>
+          <a:fontRef idx="minor">
+            <a:schemeClr val="tx1"/>
+          </a:fontRef>
+        </p:style>
+      </p:cxnSp>
+      <p:cxnSp>
+        <p:nvCxnSpPr>
+          <p:cNvPr id="80" name="Elbow Connector 79"/>
+          <p:cNvCxnSpPr>
+            <a:stCxn id="65" idx="3"/>
+            <a:endCxn id="22" idx="3"/>
+          </p:cNvCxnSpPr>
+          <p:nvPr/>
+        </p:nvCxnSpPr>
+        <p:spPr>
+          <a:xfrm flipV="1">
+            <a:off x="11491153" y="1420449"/>
+            <a:ext cx="12700" cy="2934007"/>
+          </a:xfrm>
+          <a:prstGeom prst="bentConnector3">
+            <a:avLst>
+              <a:gd name="adj1" fmla="val 1800000"/>
+            </a:avLst>
+          </a:prstGeom>
+          <a:ln>
+            <a:tailEnd type="triangle"/>
+          </a:ln>
+        </p:spPr>
+        <p:style>
+          <a:lnRef idx="1">
+            <a:schemeClr val="accent1"/>
+          </a:lnRef>
+          <a:fillRef idx="0">
+            <a:schemeClr val="accent1"/>
+          </a:fillRef>
+          <a:effectRef idx="0">
+            <a:schemeClr val="accent1"/>
+          </a:effectRef>
+          <a:fontRef idx="minor">
+            <a:schemeClr val="tx1"/>
+          </a:fontRef>
+        </p:style>
+      </p:cxnSp>
+      <p:cxnSp>
+        <p:nvCxnSpPr>
+          <p:cNvPr id="82" name="Straight Arrow Connector 81"/>
+          <p:cNvCxnSpPr>
+            <a:stCxn id="65" idx="2"/>
+          </p:cNvCxnSpPr>
+          <p:nvPr/>
+        </p:nvCxnSpPr>
+        <p:spPr>
+          <a:xfrm>
+            <a:off x="10582849" y="4653160"/>
+            <a:ext cx="0" cy="796664"/>
+          </a:xfrm>
+          <a:prstGeom prst="straightConnector1">
+            <a:avLst/>
+          </a:prstGeom>
+          <a:ln>
+            <a:tailEnd type="triangle"/>
+          </a:ln>
+        </p:spPr>
+        <p:style>
+          <a:lnRef idx="1">
+            <a:schemeClr val="accent1"/>
+          </a:lnRef>
+          <a:fillRef idx="0">
+            <a:schemeClr val="accent1"/>
+          </a:fillRef>
+          <a:effectRef idx="0">
+            <a:schemeClr val="accent1"/>
+          </a:effectRef>
+          <a:fontRef idx="minor">
+            <a:schemeClr val="tx1"/>
+          </a:fontRef>
+        </p:style>
+      </p:cxnSp>
+      <p:sp>
+        <p:nvSpPr>
+          <p:cNvPr id="83" name="Rectangle 82"/>
+          <p:cNvSpPr/>
+          <p:nvPr/>
+        </p:nvSpPr>
+        <p:spPr>
+          <a:xfrm>
+            <a:off x="9418513" y="5261584"/>
+            <a:ext cx="2328672" cy="1147707"/>
+          </a:xfrm>
+          <a:prstGeom prst="rect">
+            <a:avLst/>
+          </a:prstGeom>
+        </p:spPr>
+        <p:style>
+          <a:lnRef idx="2">
+            <a:schemeClr val="accent1">
+              <a:shade val="50000"/>
+            </a:schemeClr>
+          </a:lnRef>
+          <a:fillRef idx="1">
+            <a:schemeClr val="accent1"/>
+          </a:fillRef>
+          <a:effectRef idx="0">
+            <a:schemeClr val="accent1"/>
+          </a:effectRef>
+          <a:fontRef idx="minor">
+            <a:schemeClr val="lt1"/>
+          </a:fontRef>
+        </p:style>
+        <p:txBody>
+          <a:bodyPr rtlCol="0" anchor="ctr"/>
+          <a:lstStyle/>
+          <a:p>
+            <a:pPr algn="ctr"/>
+            <a:r>
+              <a:rPr lang="fr-FR" dirty="0" smtClean="0"/>
+              <a:t>Admin </a:t>
+            </a:r>
+            <a:r>
+              <a:rPr lang="fr-FR" dirty="0" err="1" smtClean="0"/>
+              <a:t>tool</a:t>
+            </a:r>
+            <a:r>
+              <a:rPr lang="fr-FR" dirty="0" smtClean="0"/>
+              <a:t> </a:t>
+            </a:r>
+            <a:r>
+              <a:rPr lang="fr-FR" dirty="0" err="1" smtClean="0"/>
+              <a:t>sends</a:t>
+            </a:r>
+            <a:r>
+              <a:rPr lang="fr-FR" dirty="0" smtClean="0"/>
+              <a:t> a </a:t>
+            </a:r>
+            <a:r>
+              <a:rPr lang="fr-FR" dirty="0" err="1" smtClean="0"/>
+              <a:t>private</a:t>
+            </a:r>
+            <a:r>
+              <a:rPr lang="fr-FR" dirty="0" smtClean="0"/>
+              <a:t> message to the </a:t>
+            </a:r>
+            <a:r>
+              <a:rPr lang="fr-FR" dirty="0" err="1" smtClean="0"/>
+              <a:t>student</a:t>
+            </a:r>
+            <a:endParaRPr lang="fr-FR" dirty="0"/>
+          </a:p>
+        </p:txBody>
+      </p:sp>
+      <p:sp>
+        <p:nvSpPr>
+          <p:cNvPr id="84" name="Rectangle 83"/>
+          <p:cNvSpPr/>
+          <p:nvPr/>
+        </p:nvSpPr>
+        <p:spPr>
+          <a:xfrm>
+            <a:off x="7306248" y="3447328"/>
+            <a:ext cx="1881377" cy="1046402"/>
+          </a:xfrm>
+          <a:prstGeom prst="rect">
+            <a:avLst/>
+          </a:prstGeom>
+        </p:spPr>
+        <p:style>
+          <a:lnRef idx="2">
+            <a:schemeClr val="accent1">
+              <a:shade val="50000"/>
+            </a:schemeClr>
+          </a:lnRef>
+          <a:fillRef idx="1">
+            <a:schemeClr val="accent1"/>
+          </a:fillRef>
+          <a:effectRef idx="0">
+            <a:schemeClr val="accent1"/>
+          </a:effectRef>
+          <a:fontRef idx="minor">
+            <a:schemeClr val="lt1"/>
+          </a:fontRef>
+        </p:style>
+        <p:txBody>
+          <a:bodyPr rtlCol="0" anchor="ctr"/>
+          <a:lstStyle/>
+          <a:p>
+            <a:pPr algn="ctr"/>
+            <a:r>
+              <a:rPr lang="fr-FR" dirty="0" smtClean="0"/>
+              <a:t>Class </a:t>
+            </a:r>
+            <a:r>
+              <a:rPr lang="fr-FR" dirty="0" err="1" smtClean="0"/>
+              <a:t>status</a:t>
+            </a:r>
+            <a:r>
+              <a:rPr lang="fr-FR" dirty="0" smtClean="0"/>
+              <a:t> changes to </a:t>
+            </a:r>
+            <a:r>
+              <a:rPr lang="fr-FR" dirty="0" err="1" smtClean="0"/>
+              <a:t>Pending</a:t>
+            </a:r>
+            <a:r>
+              <a:rPr lang="fr-FR" dirty="0" smtClean="0"/>
+              <a:t> </a:t>
+            </a:r>
+            <a:r>
+              <a:rPr lang="fr-FR" dirty="0" err="1" smtClean="0"/>
+              <a:t>approval</a:t>
+            </a:r>
+            <a:endParaRPr lang="fr-FR" dirty="0"/>
+          </a:p>
+        </p:txBody>
+      </p:sp>
+      <p:cxnSp>
+        <p:nvCxnSpPr>
+          <p:cNvPr id="86" name="Straight Arrow Connector 85"/>
+          <p:cNvCxnSpPr>
+            <a:stCxn id="64" idx="1"/>
+            <a:endCxn id="84" idx="0"/>
+          </p:cNvCxnSpPr>
+          <p:nvPr/>
+        </p:nvCxnSpPr>
+        <p:spPr>
+          <a:xfrm flipH="1">
+            <a:off x="8246937" y="2878095"/>
+            <a:ext cx="1427608" cy="569233"/>
+          </a:xfrm>
+          <a:prstGeom prst="straightConnector1">
             <a:avLst/>
           </a:prstGeom>
           <a:ln>
@@ -6765,7 +7219,15 @@
           <a:p>
             <a:r>
               <a:rPr lang="fr-FR" dirty="0" smtClean="0"/>
-              <a:t>FAQ flow – Pri2</a:t>
+              <a:t>Q&amp;A </a:t>
+            </a:r>
+            <a:r>
+              <a:rPr lang="fr-FR" dirty="0" smtClean="0"/>
+              <a:t>flow </a:t>
+            </a:r>
+            <a:r>
+              <a:rPr lang="fr-FR" dirty="0" smtClean="0"/>
+              <a:t>– Pri2</a:t>
             </a:r>
             <a:endParaRPr lang="fr-FR" dirty="0"/>
           </a:p>
@@ -6809,7 +7271,11 @@
             <a:pPr algn="ctr"/>
             <a:r>
               <a:rPr lang="fr-FR" dirty="0" smtClean="0"/>
-              <a:t>Select FAQ tab</a:t>
+              <a:t>Select </a:t>
+            </a:r>
+            <a:r>
+              <a:rPr lang="fr-FR" dirty="0" smtClean="0"/>
+              <a:t>Q &amp;A tab</a:t>
             </a:r>
             <a:endParaRPr lang="fr-FR" dirty="0"/>
           </a:p>
@@ -6900,12 +7366,20 @@
           <a:p>
             <a:pPr algn="ctr"/>
             <a:r>
-              <a:rPr lang="fr-FR" dirty="0" smtClean="0"/>
-              <a:t>Compose question and </a:t>
+              <a:rPr lang="fr-FR" dirty="0" err="1" smtClean="0"/>
+              <a:t>Choose</a:t>
+            </a:r>
+            <a:r>
+              <a:rPr lang="fr-FR" dirty="0" smtClean="0"/>
+              <a:t> to </a:t>
             </a:r>
             <a:r>
               <a:rPr lang="fr-FR" dirty="0" err="1" smtClean="0"/>
               <a:t>submit</a:t>
+            </a:r>
+            <a:r>
+              <a:rPr lang="fr-FR" dirty="0" smtClean="0"/>
+              <a:t> a question</a:t>
             </a:r>
             <a:endParaRPr lang="fr-FR" dirty="0"/>
           </a:p>
@@ -7185,6 +7659,14 @@
               <a:rPr lang="fr-FR" dirty="0" err="1" smtClean="0"/>
               <a:t>Inbox</a:t>
             </a:r>
+            <a:r>
+              <a:rPr lang="fr-FR" dirty="0" smtClean="0"/>
+              <a:t> - </a:t>
+            </a:r>
+            <a:r>
+              <a:rPr lang="fr-FR" dirty="0" err="1" smtClean="0"/>
+              <a:t>Private</a:t>
+            </a:r>
             <a:endParaRPr lang="fr-FR" dirty="0"/>
           </a:p>
         </p:txBody>
@@ -7233,8 +7715,8 @@
         </p:nvSpPr>
         <p:spPr>
           <a:xfrm>
-            <a:off x="2423922" y="3476121"/>
-            <a:ext cx="2203670" cy="850082"/>
+            <a:off x="2267712" y="3411954"/>
+            <a:ext cx="2359880" cy="1034919"/>
           </a:xfrm>
           <a:prstGeom prst="rect">
             <a:avLst/>
@@ -7266,15 +7748,31 @@
             <a:pPr algn="ctr"/>
             <a:r>
               <a:rPr lang="fr-FR" dirty="0" smtClean="0"/>
-              <a:t>Teacher notices to </a:t>
-            </a:r>
-            <a:r>
-              <a:rPr lang="fr-FR" dirty="0" err="1" smtClean="0"/>
-              <a:t>recieve</a:t>
-            </a:r>
-            <a:r>
-              <a:rPr lang="fr-FR" dirty="0" smtClean="0"/>
-              <a:t> a question at </a:t>
+              <a:t>Teacher notices </a:t>
+            </a:r>
+            <a:r>
+              <a:rPr lang="fr-FR" dirty="0" smtClean="0"/>
+              <a:t>a </a:t>
+            </a:r>
+            <a:r>
+              <a:rPr lang="fr-FR" dirty="0" smtClean="0"/>
+              <a:t>question </a:t>
+            </a:r>
+            <a:r>
+              <a:rPr lang="fr-FR" dirty="0" err="1" smtClean="0"/>
+              <a:t>from</a:t>
+            </a:r>
+            <a:r>
+              <a:rPr lang="fr-FR" dirty="0" smtClean="0"/>
+              <a:t> </a:t>
+            </a:r>
+            <a:r>
+              <a:rPr lang="fr-FR" dirty="0" err="1" smtClean="0"/>
+              <a:t>student</a:t>
+            </a:r>
+            <a:r>
+              <a:rPr lang="fr-FR" dirty="0" smtClean="0"/>
+              <a:t> at </a:t>
             </a:r>
             <a:r>
               <a:rPr lang="fr-FR" dirty="0" err="1" smtClean="0"/>
@@ -7282,7 +7780,19 @@
             </a:r>
             <a:r>
               <a:rPr lang="fr-FR" dirty="0" smtClean="0"/>
-              <a:t> at admin </a:t>
+              <a:t> </a:t>
+            </a:r>
+            <a:r>
+              <a:rPr lang="fr-FR" dirty="0" err="1" smtClean="0"/>
+              <a:t>from</a:t>
+            </a:r>
+            <a:r>
+              <a:rPr lang="fr-FR" dirty="0" smtClean="0"/>
+              <a:t> </a:t>
+            </a:r>
+            <a:r>
+              <a:rPr lang="fr-FR" dirty="0" smtClean="0"/>
+              <a:t>admin </a:t>
             </a:r>
             <a:r>
               <a:rPr lang="fr-FR" dirty="0" err="1" smtClean="0"/>
@@ -7300,7 +7810,7 @@
         </p:nvSpPr>
         <p:spPr>
           <a:xfrm>
-            <a:off x="6096000" y="3472245"/>
+            <a:off x="6096000" y="3504372"/>
             <a:ext cx="2203670" cy="850082"/>
           </a:xfrm>
           <a:prstGeom prst="rect">
@@ -7336,24 +7846,8 @@
               <a:t>Teacher </a:t>
             </a:r>
             <a:r>
-              <a:rPr lang="fr-FR" dirty="0" err="1" smtClean="0"/>
-              <a:t>answers</a:t>
-            </a:r>
-            <a:r>
-              <a:rPr lang="fr-FR" dirty="0" smtClean="0"/>
-              <a:t> the question and </a:t>
-            </a:r>
-            <a:r>
-              <a:rPr lang="fr-FR" dirty="0" err="1" smtClean="0"/>
-              <a:t>sends</a:t>
-            </a:r>
-            <a:r>
-              <a:rPr lang="fr-FR" dirty="0" smtClean="0"/>
-              <a:t> to </a:t>
-            </a:r>
-            <a:r>
-              <a:rPr lang="fr-FR" dirty="0" err="1" smtClean="0"/>
-              <a:t>Inbox</a:t>
+              <a:rPr lang="fr-FR" dirty="0" smtClean="0"/>
+              <a:t>replies back the question</a:t>
             </a:r>
             <a:endParaRPr lang="fr-FR" dirty="0"/>
           </a:p>
@@ -7370,8 +7864,8 @@
         </p:nvCxnSpPr>
         <p:spPr>
           <a:xfrm flipV="1">
-            <a:off x="4627592" y="3897286"/>
-            <a:ext cx="1468408" cy="3876"/>
+            <a:off x="4627592" y="3929413"/>
+            <a:ext cx="1468408" cy="1"/>
           </a:xfrm>
           <a:prstGeom prst="straightConnector1">
             <a:avLst/>
@@ -7405,9 +7899,9 @@
           <p:nvPr/>
         </p:nvCxnSpPr>
         <p:spPr>
-          <a:xfrm>
+          <a:xfrm flipV="1">
             <a:off x="8299670" y="3897286"/>
-            <a:ext cx="1583504" cy="0"/>
+            <a:ext cx="1583504" cy="32127"/>
           </a:xfrm>
           <a:prstGeom prst="straightConnector1">
             <a:avLst/>
@@ -7446,7 +7940,7 @@
             <a:avLst/>
           </a:prstGeom>
           <a:solidFill>
-            <a:schemeClr val="accent6"/>
+            <a:srgbClr val="FF0000"/>
           </a:solidFill>
         </p:spPr>
         <p:style>
@@ -7577,8 +8071,8 @@
         </p:nvCxnSpPr>
         <p:spPr>
           <a:xfrm>
-            <a:off x="7197835" y="4322327"/>
-            <a:ext cx="13682" cy="421164"/>
+            <a:off x="7197835" y="4354454"/>
+            <a:ext cx="13682" cy="389037"/>
           </a:xfrm>
           <a:prstGeom prst="straightConnector1">
             <a:avLst/>

</xml_diff>

<commit_message>
update student flow and wireframe
</commit_message>
<xml_diff>
--- a/Students flow.pptx
+++ b/Students flow.pptx
@@ -249,7 +249,7 @@
           <a:p>
             <a:fld id="{244407FF-88D8-4799-B8FC-E0203F3B8DD7}" type="datetimeFigureOut">
               <a:rPr lang="fr-FR" smtClean="0"/>
-              <a:t>03/10/2014</a:t>
+              <a:t>04/10/2014</a:t>
             </a:fld>
             <a:endParaRPr lang="fr-FR"/>
           </a:p>
@@ -419,7 +419,7 @@
           <a:p>
             <a:fld id="{244407FF-88D8-4799-B8FC-E0203F3B8DD7}" type="datetimeFigureOut">
               <a:rPr lang="fr-FR" smtClean="0"/>
-              <a:t>03/10/2014</a:t>
+              <a:t>04/10/2014</a:t>
             </a:fld>
             <a:endParaRPr lang="fr-FR"/>
           </a:p>
@@ -599,7 +599,7 @@
           <a:p>
             <a:fld id="{244407FF-88D8-4799-B8FC-E0203F3B8DD7}" type="datetimeFigureOut">
               <a:rPr lang="fr-FR" smtClean="0"/>
-              <a:t>03/10/2014</a:t>
+              <a:t>04/10/2014</a:t>
             </a:fld>
             <a:endParaRPr lang="fr-FR"/>
           </a:p>
@@ -769,7 +769,7 @@
           <a:p>
             <a:fld id="{244407FF-88D8-4799-B8FC-E0203F3B8DD7}" type="datetimeFigureOut">
               <a:rPr lang="fr-FR" smtClean="0"/>
-              <a:t>03/10/2014</a:t>
+              <a:t>04/10/2014</a:t>
             </a:fld>
             <a:endParaRPr lang="fr-FR"/>
           </a:p>
@@ -1015,7 +1015,7 @@
           <a:p>
             <a:fld id="{244407FF-88D8-4799-B8FC-E0203F3B8DD7}" type="datetimeFigureOut">
               <a:rPr lang="fr-FR" smtClean="0"/>
-              <a:t>03/10/2014</a:t>
+              <a:t>04/10/2014</a:t>
             </a:fld>
             <a:endParaRPr lang="fr-FR"/>
           </a:p>
@@ -1247,7 +1247,7 @@
           <a:p>
             <a:fld id="{244407FF-88D8-4799-B8FC-E0203F3B8DD7}" type="datetimeFigureOut">
               <a:rPr lang="fr-FR" smtClean="0"/>
-              <a:t>03/10/2014</a:t>
+              <a:t>04/10/2014</a:t>
             </a:fld>
             <a:endParaRPr lang="fr-FR"/>
           </a:p>
@@ -1614,7 +1614,7 @@
           <a:p>
             <a:fld id="{244407FF-88D8-4799-B8FC-E0203F3B8DD7}" type="datetimeFigureOut">
               <a:rPr lang="fr-FR" smtClean="0"/>
-              <a:t>03/10/2014</a:t>
+              <a:t>04/10/2014</a:t>
             </a:fld>
             <a:endParaRPr lang="fr-FR"/>
           </a:p>
@@ -1732,7 +1732,7 @@
           <a:p>
             <a:fld id="{244407FF-88D8-4799-B8FC-E0203F3B8DD7}" type="datetimeFigureOut">
               <a:rPr lang="fr-FR" smtClean="0"/>
-              <a:t>03/10/2014</a:t>
+              <a:t>04/10/2014</a:t>
             </a:fld>
             <a:endParaRPr lang="fr-FR"/>
           </a:p>
@@ -1827,7 +1827,7 @@
           <a:p>
             <a:fld id="{244407FF-88D8-4799-B8FC-E0203F3B8DD7}" type="datetimeFigureOut">
               <a:rPr lang="fr-FR" smtClean="0"/>
-              <a:t>03/10/2014</a:t>
+              <a:t>04/10/2014</a:t>
             </a:fld>
             <a:endParaRPr lang="fr-FR"/>
           </a:p>
@@ -2104,7 +2104,7 @@
           <a:p>
             <a:fld id="{244407FF-88D8-4799-B8FC-E0203F3B8DD7}" type="datetimeFigureOut">
               <a:rPr lang="fr-FR" smtClean="0"/>
-              <a:t>03/10/2014</a:t>
+              <a:t>04/10/2014</a:t>
             </a:fld>
             <a:endParaRPr lang="fr-FR"/>
           </a:p>
@@ -2357,7 +2357,7 @@
           <a:p>
             <a:fld id="{244407FF-88D8-4799-B8FC-E0203F3B8DD7}" type="datetimeFigureOut">
               <a:rPr lang="fr-FR" smtClean="0"/>
-              <a:t>03/10/2014</a:t>
+              <a:t>04/10/2014</a:t>
             </a:fld>
             <a:endParaRPr lang="fr-FR"/>
           </a:p>
@@ -2570,7 +2570,7 @@
           <a:p>
             <a:fld id="{244407FF-88D8-4799-B8FC-E0203F3B8DD7}" type="datetimeFigureOut">
               <a:rPr lang="fr-FR" smtClean="0"/>
-              <a:t>03/10/2014</a:t>
+              <a:t>04/10/2014</a:t>
             </a:fld>
             <a:endParaRPr lang="fr-FR"/>
           </a:p>
@@ -3194,7 +3194,7 @@
         </p:nvSpPr>
         <p:spPr>
           <a:xfrm>
-            <a:off x="4242514" y="1135148"/>
+            <a:off x="3714665" y="1116705"/>
             <a:ext cx="2520764" cy="1213104"/>
           </a:xfrm>
           <a:prstGeom prst="rect">
@@ -3523,9 +3523,9 @@
           <p:nvPr/>
         </p:nvCxnSpPr>
         <p:spPr>
-          <a:xfrm>
-            <a:off x="2916089" y="1729585"/>
-            <a:ext cx="1326425" cy="12115"/>
+          <a:xfrm flipV="1">
+            <a:off x="2916089" y="1723257"/>
+            <a:ext cx="798576" cy="6328"/>
           </a:xfrm>
           <a:prstGeom prst="straightConnector1">
             <a:avLst/>
@@ -3559,9 +3559,9 @@
           <p:nvPr/>
         </p:nvCxnSpPr>
         <p:spPr>
-          <a:xfrm flipV="1">
-            <a:off x="6763278" y="1729585"/>
-            <a:ext cx="683614" cy="12115"/>
+          <a:xfrm>
+            <a:off x="6235429" y="1723257"/>
+            <a:ext cx="1211463" cy="6328"/>
           </a:xfrm>
           <a:prstGeom prst="straightConnector1">
             <a:avLst/>
@@ -3651,7 +3651,23 @@
             </a:r>
             <a:r>
               <a:rPr lang="fr-FR" dirty="0" smtClean="0"/>
-              <a:t> flow</a:t>
+              <a:t> </a:t>
+            </a:r>
+            <a:r>
+              <a:rPr lang="fr-FR" dirty="0" smtClean="0"/>
+              <a:t>flow </a:t>
+            </a:r>
+            <a:r>
+              <a:rPr lang="fr-FR" altLang="zh-CN" dirty="0" smtClean="0"/>
+              <a:t>– </a:t>
+            </a:r>
+            <a:r>
+              <a:rPr lang="fr-FR" altLang="zh-CN" dirty="0" err="1" smtClean="0"/>
+              <a:t>sign</a:t>
+            </a:r>
+            <a:r>
+              <a:rPr lang="fr-FR" altLang="zh-CN" dirty="0" smtClean="0"/>
+              <a:t> up</a:t>
             </a:r>
             <a:endParaRPr lang="fr-FR" dirty="0"/>
           </a:p>
@@ -3783,11 +3799,7 @@
             <a:pPr algn="ctr"/>
             <a:r>
               <a:rPr lang="fr-FR" dirty="0" smtClean="0"/>
-              <a:t>Access </a:t>
-            </a:r>
-            <a:r>
-              <a:rPr lang="fr-FR" dirty="0" smtClean="0"/>
-              <a:t>code?</a:t>
+              <a:t>Access code?</a:t>
             </a:r>
             <a:endParaRPr lang="fr-FR" dirty="0"/>
           </a:p>
@@ -3867,7 +3879,11 @@
             <a:pPr algn="ctr"/>
             <a:r>
               <a:rPr lang="en-US" dirty="0" smtClean="0"/>
-              <a:t>Show all messages in Inbox and title of tests</a:t>
+              <a:t>Show </a:t>
+            </a:r>
+            <a:r>
+              <a:rPr lang="en-US" dirty="0" smtClean="0"/>
+              <a:t>Test tab</a:t>
             </a:r>
             <a:endParaRPr lang="fr-FR" dirty="0"/>
           </a:p>
@@ -3947,7 +3963,11 @@
             <a:pPr algn="ctr"/>
             <a:r>
               <a:rPr lang="en-US" dirty="0" smtClean="0"/>
-              <a:t>Show list of classes to apply for</a:t>
+              <a:t>Show </a:t>
+            </a:r>
+            <a:r>
+              <a:rPr lang="en-US" dirty="0" smtClean="0"/>
+              <a:t>Class tab</a:t>
             </a:r>
             <a:endParaRPr lang="fr-FR" dirty="0"/>
           </a:p>
@@ -4948,11 +4968,7 @@
             <a:pPr algn="ctr"/>
             <a:r>
               <a:rPr lang="fr-FR" dirty="0" smtClean="0"/>
-              <a:t>Select </a:t>
-            </a:r>
-            <a:r>
-              <a:rPr lang="fr-FR" dirty="0" smtClean="0"/>
-              <a:t>Test tab</a:t>
+              <a:t>Select Test tab</a:t>
             </a:r>
             <a:endParaRPr lang="fr-FR" dirty="0"/>
           </a:p>
@@ -5240,11 +5256,7 @@
             <a:pPr algn="ctr"/>
             <a:r>
               <a:rPr lang="fr-FR" dirty="0" smtClean="0"/>
-              <a:t>Check </a:t>
-            </a:r>
-            <a:r>
-              <a:rPr lang="fr-FR" dirty="0" smtClean="0"/>
-              <a:t>score and </a:t>
+              <a:t>Check score and </a:t>
             </a:r>
             <a:r>
               <a:rPr lang="fr-FR" dirty="0" err="1" smtClean="0"/>
@@ -5623,11 +5635,7 @@
             </a:r>
             <a:r>
               <a:rPr lang="fr-FR" sz="3600" dirty="0" smtClean="0"/>
-              <a:t> </a:t>
-            </a:r>
-            <a:r>
-              <a:rPr lang="fr-FR" sz="3600" dirty="0" smtClean="0"/>
-              <a:t>(no </a:t>
+              <a:t> (no </a:t>
             </a:r>
             <a:r>
               <a:rPr lang="fr-FR" sz="3600" dirty="0" err="1" smtClean="0"/>
@@ -6266,11 +6274,7 @@
             <a:pPr algn="ctr"/>
             <a:r>
               <a:rPr lang="fr-FR" altLang="zh-CN" dirty="0" smtClean="0"/>
-              <a:t>For </a:t>
-            </a:r>
-            <a:r>
-              <a:rPr lang="fr-FR" altLang="zh-CN" dirty="0" smtClean="0"/>
-              <a:t>classes </a:t>
+              <a:t>For classes </a:t>
             </a:r>
             <a:r>
               <a:rPr lang="fr-FR" altLang="zh-CN" dirty="0" err="1" smtClean="0"/>
@@ -6370,11 +6374,7 @@
             <a:pPr algn="ctr"/>
             <a:r>
               <a:rPr lang="fr-FR" altLang="zh-CN" dirty="0" smtClean="0"/>
-              <a:t>For </a:t>
-            </a:r>
-            <a:r>
-              <a:rPr lang="fr-FR" altLang="zh-CN" dirty="0" smtClean="0"/>
-              <a:t>classes NOT </a:t>
+              <a:t>For classes NOT </a:t>
             </a:r>
             <a:r>
               <a:rPr lang="fr-FR" altLang="zh-CN" dirty="0" err="1" smtClean="0"/>
@@ -6486,11 +6486,7 @@
             </a:r>
             <a:r>
               <a:rPr lang="fr-FR" dirty="0" smtClean="0"/>
-              <a:t> o</a:t>
-            </a:r>
-            <a:r>
-              <a:rPr lang="fr-FR" dirty="0" smtClean="0"/>
-              <a:t>f </a:t>
+              <a:t> of </a:t>
             </a:r>
             <a:r>
               <a:rPr lang="fr-FR" dirty="0" err="1" smtClean="0"/>
@@ -6498,11 +6494,7 @@
             </a:r>
             <a:r>
               <a:rPr lang="fr-FR" dirty="0" smtClean="0"/>
-              <a:t> </a:t>
-            </a:r>
-            <a:r>
-              <a:rPr lang="fr-FR" dirty="0" smtClean="0"/>
-              <a:t>classes</a:t>
+              <a:t> classes</a:t>
             </a:r>
             <a:endParaRPr lang="fr-FR" dirty="0"/>
           </a:p>
@@ -7219,15 +7211,7 @@
           <a:p>
             <a:r>
               <a:rPr lang="fr-FR" dirty="0" smtClean="0"/>
-              <a:t>Q&amp;A </a:t>
-            </a:r>
-            <a:r>
-              <a:rPr lang="fr-FR" dirty="0" smtClean="0"/>
-              <a:t>flow </a:t>
-            </a:r>
-            <a:r>
-              <a:rPr lang="fr-FR" dirty="0" smtClean="0"/>
-              <a:t>– Pri2</a:t>
+              <a:t>Q&amp;A flow – Pri2</a:t>
             </a:r>
             <a:endParaRPr lang="fr-FR" dirty="0"/>
           </a:p>
@@ -7271,11 +7255,7 @@
             <a:pPr algn="ctr"/>
             <a:r>
               <a:rPr lang="fr-FR" dirty="0" smtClean="0"/>
-              <a:t>Select </a:t>
-            </a:r>
-            <a:r>
-              <a:rPr lang="fr-FR" dirty="0" smtClean="0"/>
-              <a:t>Q &amp;A tab</a:t>
+              <a:t>Select Q &amp;A tab</a:t>
             </a:r>
             <a:endParaRPr lang="fr-FR" dirty="0"/>
           </a:p>
@@ -7748,15 +7728,7 @@
             <a:pPr algn="ctr"/>
             <a:r>
               <a:rPr lang="fr-FR" dirty="0" smtClean="0"/>
-              <a:t>Teacher notices </a:t>
-            </a:r>
-            <a:r>
-              <a:rPr lang="fr-FR" dirty="0" smtClean="0"/>
-              <a:t>a </a:t>
-            </a:r>
-            <a:r>
-              <a:rPr lang="fr-FR" dirty="0" smtClean="0"/>
-              <a:t>question </a:t>
+              <a:t>Teacher notices a question </a:t>
             </a:r>
             <a:r>
               <a:rPr lang="fr-FR" dirty="0" err="1" smtClean="0"/>
@@ -7788,11 +7760,7 @@
             </a:r>
             <a:r>
               <a:rPr lang="fr-FR" dirty="0" smtClean="0"/>
-              <a:t> </a:t>
-            </a:r>
-            <a:r>
-              <a:rPr lang="fr-FR" dirty="0" smtClean="0"/>
-              <a:t>admin </a:t>
+              <a:t> admin </a:t>
             </a:r>
             <a:r>
               <a:rPr lang="fr-FR" dirty="0" err="1" smtClean="0"/>
@@ -7843,11 +7811,7 @@
             <a:pPr algn="ctr"/>
             <a:r>
               <a:rPr lang="fr-FR" dirty="0" smtClean="0"/>
-              <a:t>Teacher </a:t>
-            </a:r>
-            <a:r>
-              <a:rPr lang="fr-FR" dirty="0" smtClean="0"/>
-              <a:t>replies back the question</a:t>
+              <a:t>Teacher replies back the question</a:t>
             </a:r>
             <a:endParaRPr lang="fr-FR" dirty="0"/>
           </a:p>

</xml_diff>